<commit_message>
Update presentation with official abstract information
Major updates based on the official conference abstract:
- Added complete authors and institutions (UNPSJB, CONICET)
- New slide about ROMA (Red de Observación Marina Argentina)
- Emphasized blue economy and operational oceanography
- Mentioned IADO as data source provider
- Specified Davis weather stations
- Added Anime.js to visualization technologies
- Updated dashboard description with control panel features
- Improved conclusions to align with abstract goals
- Added all relevant institutions in acknowledgments
- Updated contact email: prosales@unpata.edu.ar
- Presentation now has 16 slides (added ROMA context)

Aligns presentation with submitted abstract for XIIJNCM.
</commit_message>
<xml_diff>
--- a/Presentacion_OOGSJ_XIIJNCM.pptx
+++ b/Presentacion_OOGSJ_XIIJNCM.pptx
@@ -20,6 +20,7 @@
     <p:sldId id="268" r:id="rId19"/>
     <p:sldId id="269" r:id="rId20"/>
     <p:sldId id="270" r:id="rId21"/>
+    <p:sldId id="271" r:id="rId22"/>
   </p:sldIdLst>
   <p:sldSz cx="9144000" cy="6858000" type="screen4x3"/>
   <p:notesSz cx="6858000" cy="9144000"/>
@@ -3118,7 +3119,77 @@
         </p:nvSpPr>
         <p:spPr>
           <a:xfrm>
-            <a:off x="457200" y="1828800"/>
+            <a:off x="457200" y="1097280"/>
+            <a:ext cx="8229600" cy="1645920"/>
+          </a:xfrm>
+          <a:prstGeom prst="rect">
+            <a:avLst/>
+          </a:prstGeom>
+          <a:noFill/>
+        </p:spPr>
+        <p:txBody>
+          <a:bodyPr wrap="square">
+            <a:spAutoFit/>
+          </a:bodyPr>
+          <a:lstStyle/>
+          <a:p>
+            <a:pPr algn="ctr">
+              <a:defRPr sz="2800" b="1">
+                <a:solidFill>
+                  <a:srgbClr val="003366"/>
+                </a:solidFill>
+              </a:defRPr>
+            </a:pPr>
+            <a:r>
+              <a:t>Plataforma Modular para Ingesta, Procesamiento y Visualización de Datos Oceanográficos y Meteorológicos en el Golfo San Jorge</a:t>
+            </a:r>
+          </a:p>
+        </p:txBody>
+      </p:sp>
+      <p:sp>
+        <p:nvSpPr>
+          <p:cNvPr id="3" name="TextBox 2"/>
+          <p:cNvSpPr txBox="1"/>
+          <p:nvPr/>
+        </p:nvSpPr>
+        <p:spPr>
+          <a:xfrm>
+            <a:off x="457200" y="2926080"/>
+            <a:ext cx="8229600" cy="914400"/>
+          </a:xfrm>
+          <a:prstGeom prst="rect">
+            <a:avLst/>
+          </a:prstGeom>
+          <a:noFill/>
+        </p:spPr>
+        <p:txBody>
+          <a:bodyPr wrap="square">
+            <a:spAutoFit/>
+          </a:bodyPr>
+          <a:lstStyle/>
+          <a:p>
+            <a:pPr algn="ctr">
+              <a:defRPr sz="1600">
+                <a:solidFill>
+                  <a:srgbClr val="282828"/>
+                </a:solidFill>
+              </a:defRPr>
+            </a:pPr>
+            <a:r>
+              <a:t>Rosales Pablo¹, De Marziani Carlos¹'², Micheletto Matías², García Franco¹</a:t>
+            </a:r>
+          </a:p>
+        </p:txBody>
+      </p:sp>
+      <p:sp>
+        <p:nvSpPr>
+          <p:cNvPr id="4" name="TextBox 3"/>
+          <p:cNvSpPr txBox="1"/>
+          <p:nvPr/>
+        </p:nvSpPr>
+        <p:spPr>
+          <a:xfrm>
+            <a:off x="457200" y="3931920"/>
             <a:ext cx="8229600" cy="1371600"/>
           </a:xfrm>
           <a:prstGeom prst="rect">
@@ -3127,73 +3198,45 @@
           <a:noFill/>
         </p:spPr>
         <p:txBody>
-          <a:bodyPr wrap="none">
+          <a:bodyPr wrap="square">
             <a:spAutoFit/>
           </a:bodyPr>
           <a:lstStyle/>
           <a:p>
             <a:pPr algn="ctr">
-              <a:defRPr sz="3600" b="1">
-                <a:solidFill>
-                  <a:srgbClr val="003366"/>
-                </a:solidFill>
-              </a:defRPr>
-            </a:pPr>
-            <a:r>
-              <a:t>Sistema de Observación Oceanográfica</a:t>
-            </a:r>
-          </a:p>
-          <a:p>
-            <a:r>
-              <a:t>Golfo San Jorge (OOGSJ)</a:t>
-            </a:r>
-          </a:p>
-        </p:txBody>
-      </p:sp>
-      <p:sp>
-        <p:nvSpPr>
-          <p:cNvPr id="3" name="TextBox 2"/>
+              <a:defRPr sz="1200">
+                <a:solidFill>
+                  <a:srgbClr val="282828"/>
+                </a:solidFill>
+              </a:defRPr>
+            </a:pPr>
+            <a:r>
+              <a:t>¹ Facultad de Ingeniería, Universidad Nacional de la Patagonia San Juan Bosco</a:t>
+            </a:r>
+          </a:p>
+          <a:p>
+            <a:pPr algn="ctr">
+              <a:defRPr sz="1200">
+                <a:solidFill>
+                  <a:srgbClr val="282828"/>
+                </a:solidFill>
+              </a:defRPr>
+            </a:pPr>
+            <a:r>
+              <a:t>² Instituto Multidisciplinario para la Investigación y el Desarrollo Productivo y Social de la Cuenca Golfo San Jorge, CONICET</a:t>
+            </a:r>
+          </a:p>
+        </p:txBody>
+      </p:sp>
+      <p:sp>
+        <p:nvSpPr>
+          <p:cNvPr id="5" name="TextBox 4"/>
           <p:cNvSpPr txBox="1"/>
           <p:nvPr/>
         </p:nvSpPr>
         <p:spPr>
           <a:xfrm>
-            <a:off x="457200" y="3474720"/>
-            <a:ext cx="8229600" cy="731520"/>
-          </a:xfrm>
-          <a:prstGeom prst="rect">
-            <a:avLst/>
-          </a:prstGeom>
-          <a:noFill/>
-        </p:spPr>
-        <p:txBody>
-          <a:bodyPr wrap="none">
-            <a:spAutoFit/>
-          </a:bodyPr>
-          <a:lstStyle/>
-          <a:p>
-            <a:pPr algn="ctr">
-              <a:defRPr sz="1800">
-                <a:solidFill>
-                  <a:srgbClr val="006699"/>
-                </a:solidFill>
-              </a:defRPr>
-            </a:pPr>
-            <a:r>
-              <a:t>Monitoreo en Tiempo Real de Variables Oceanográficas y Meteorológicas</a:t>
-            </a:r>
-          </a:p>
-        </p:txBody>
-      </p:sp>
-      <p:sp>
-        <p:nvSpPr>
-          <p:cNvPr id="4" name="TextBox 3"/>
-          <p:cNvSpPr txBox="1"/>
-          <p:nvPr/>
-        </p:nvSpPr>
-        <p:spPr>
-          <a:xfrm>
-            <a:off x="457200" y="5029200"/>
+            <a:off x="457200" y="5486400"/>
             <a:ext cx="8229600" cy="457200"/>
           </a:xfrm>
           <a:prstGeom prst="rect">
@@ -3210,7 +3253,7 @@
             <a:pPr algn="ctr">
               <a:defRPr sz="1600" i="1">
                 <a:solidFill>
-                  <a:srgbClr val="282828"/>
+                  <a:srgbClr val="006699"/>
                 </a:solidFill>
               </a:defRPr>
             </a:pPr>
@@ -3222,14 +3265,14 @@
       </p:sp>
       <p:sp>
         <p:nvSpPr>
-          <p:cNvPr id="5" name="TextBox 4"/>
+          <p:cNvPr id="6" name="TextBox 5"/>
           <p:cNvSpPr txBox="1"/>
           <p:nvPr/>
         </p:nvSpPr>
         <p:spPr>
           <a:xfrm>
-            <a:off x="457200" y="5669280"/>
-            <a:ext cx="8229600" cy="731520"/>
+            <a:off x="457200" y="6126480"/>
+            <a:ext cx="8229600" cy="457200"/>
           </a:xfrm>
           <a:prstGeom prst="rect">
             <a:avLst/>
@@ -3249,11 +3292,6 @@
                 </a:solidFill>
               </a:defRPr>
             </a:pPr>
-            <a:r>
-              <a:t>Observatorio Oceanográfico Golfo San Jorge</a:t>
-            </a:r>
-          </a:p>
-          <a:p>
             <a:r>
               <a:t>2024</a:t>
             </a:r>
@@ -3301,7 +3339,7 @@
               </a:defRPr>
             </a:pPr>
             <a:r>
-              <a:t>Interfaz de Visualización</a:t>
+              <a:t>Flujo de Ingesta y Procesamiento</a:t>
             </a:r>
           </a:p>
         </p:txBody>
@@ -3323,122 +3361,164 @@
           <a:p/>
           <a:p>
             <a:pPr>
-              <a:spcAft>
-                <a:spcPts val="1000"/>
-              </a:spcAft>
-              <a:defRPr sz="2200" b="1">
+              <a:defRPr sz="1800" b="1">
                 <a:solidFill>
                   <a:srgbClr val="0099CC"/>
                 </a:solidFill>
               </a:defRPr>
             </a:pPr>
             <a:r>
-              <a:t>Características de la Interfaz Web:</a:t>
+              <a:t>1. Adquisición automática</a:t>
             </a:r>
           </a:p>
           <a:p>
             <a:pPr lvl="1">
               <a:spcAft>
-                <a:spcPts val="600"/>
-              </a:spcAft>
-              <a:defRPr sz="1700">
-                <a:solidFill>
-                  <a:srgbClr val="282828"/>
-                </a:solidFill>
-              </a:defRPr>
-            </a:pPr>
-            <a:r>
-              <a:t>Gráficos interactivos de series temporales (D3.js)</a:t>
+                <a:spcPts val="800"/>
+              </a:spcAft>
+              <a:defRPr sz="1600">
+                <a:solidFill>
+                  <a:srgbClr val="282828"/>
+                </a:solidFill>
+              </a:defRPr>
+            </a:pPr>
+            <a:r>
+              <a:t>APIs externas (IADO, WeatherLink, SHN)</a:t>
+            </a:r>
+          </a:p>
+          <a:p>
+            <a:pPr>
+              <a:defRPr sz="1800" b="1">
+                <a:solidFill>
+                  <a:srgbClr val="0099CC"/>
+                </a:solidFill>
+              </a:defRPr>
+            </a:pPr>
+            <a:r>
+              <a:t>2. Ingesta con Celery</a:t>
             </a:r>
           </a:p>
           <a:p>
             <a:pPr lvl="1">
               <a:spcAft>
-                <a:spcPts val="600"/>
-              </a:spcAft>
-              <a:defRPr sz="1700">
-                <a:solidFill>
-                  <a:srgbClr val="282828"/>
-                </a:solidFill>
-              </a:defRPr>
-            </a:pPr>
-            <a:r>
-              <a:t>Mapas georreferenciados con ubicación de plataformas (Leaflet)</a:t>
+                <a:spcPts val="800"/>
+              </a:spcAft>
+              <a:defRPr sz="1600">
+                <a:solidFill>
+                  <a:srgbClr val="282828"/>
+                </a:solidFill>
+              </a:defRPr>
+            </a:pPr>
+            <a:r>
+              <a:t>Tareas programadas y distribuidas</a:t>
+            </a:r>
+          </a:p>
+          <a:p>
+            <a:pPr>
+              <a:defRPr sz="1800" b="1">
+                <a:solidFill>
+                  <a:srgbClr val="0099CC"/>
+                </a:solidFill>
+              </a:defRPr>
+            </a:pPr>
+            <a:r>
+              <a:t>3. Control de calidad</a:t>
             </a:r>
           </a:p>
           <a:p>
             <a:pPr lvl="1">
               <a:spcAft>
-                <a:spcPts val="600"/>
-              </a:spcAft>
-              <a:defRPr sz="1700">
-                <a:solidFill>
-                  <a:srgbClr val="282828"/>
-                </a:solidFill>
-              </a:defRPr>
-            </a:pPr>
-            <a:r>
-              <a:t>Visualización de datos en tiempo real</a:t>
+                <a:spcPts val="800"/>
+              </a:spcAft>
+              <a:defRPr sz="1600">
+                <a:solidFill>
+                  <a:srgbClr val="282828"/>
+                </a:solidFill>
+              </a:defRPr>
+            </a:pPr>
+            <a:r>
+              <a:t>Validación según estándares COI</a:t>
+            </a:r>
+          </a:p>
+          <a:p>
+            <a:pPr>
+              <a:defRPr sz="1800" b="1">
+                <a:solidFill>
+                  <a:srgbClr val="0099CC"/>
+                </a:solidFill>
+              </a:defRPr>
+            </a:pPr>
+            <a:r>
+              <a:t>4. Almacenamiento</a:t>
             </a:r>
           </a:p>
           <a:p>
             <a:pPr lvl="1">
               <a:spcAft>
-                <a:spcPts val="600"/>
-              </a:spcAft>
-              <a:defRPr sz="1700">
-                <a:solidFill>
-                  <a:srgbClr val="282828"/>
-                </a:solidFill>
-              </a:defRPr>
-            </a:pPr>
-            <a:r>
-              <a:t>Selección de rangos temporales personalizados</a:t>
+                <a:spcPts val="800"/>
+              </a:spcAft>
+              <a:defRPr sz="1600">
+                <a:solidFill>
+                  <a:srgbClr val="282828"/>
+                </a:solidFill>
+              </a:defRPr>
+            </a:pPr>
+            <a:r>
+              <a:t>PostgreSQL con metadatos y trazabilidad</a:t>
+            </a:r>
+          </a:p>
+          <a:p>
+            <a:pPr>
+              <a:defRPr sz="1800" b="1">
+                <a:solidFill>
+                  <a:srgbClr val="0099CC"/>
+                </a:solidFill>
+              </a:defRPr>
+            </a:pPr>
+            <a:r>
+              <a:t>5. Procesamiento</a:t>
             </a:r>
           </a:p>
           <a:p>
             <a:pPr lvl="1">
               <a:spcAft>
-                <a:spcPts val="600"/>
-              </a:spcAft>
-              <a:defRPr sz="1700">
-                <a:solidFill>
-                  <a:srgbClr val="282828"/>
-                </a:solidFill>
-              </a:defRPr>
-            </a:pPr>
-            <a:r>
-              <a:t>Exportación de datos (CSV, PDF)</a:t>
+                <a:spcPts val="800"/>
+              </a:spcAft>
+              <a:defRPr sz="1600">
+                <a:solidFill>
+                  <a:srgbClr val="282828"/>
+                </a:solidFill>
+              </a:defRPr>
+            </a:pPr>
+            <a:r>
+              <a:t>Niveles: crudo → calibrado → derivado</a:t>
+            </a:r>
+          </a:p>
+          <a:p>
+            <a:pPr>
+              <a:defRPr sz="1800" b="1">
+                <a:solidFill>
+                  <a:srgbClr val="0099CC"/>
+                </a:solidFill>
+              </a:defRPr>
+            </a:pPr>
+            <a:r>
+              <a:t>6. Visualización</a:t>
             </a:r>
           </a:p>
           <a:p>
             <a:pPr lvl="1">
               <a:spcAft>
-                <a:spcPts val="600"/>
-              </a:spcAft>
-              <a:defRPr sz="1700">
-                <a:solidFill>
-                  <a:srgbClr val="282828"/>
-                </a:solidFill>
-              </a:defRPr>
-            </a:pPr>
-            <a:r>
-              <a:t>Acceso desde cualquier dispositivo (responsive design)</a:t>
-            </a:r>
-          </a:p>
-          <a:p>
-            <a:pPr lvl="1">
-              <a:spcAft>
-                <a:spcPts val="600"/>
-              </a:spcAft>
-              <a:defRPr sz="1700">
-                <a:solidFill>
-                  <a:srgbClr val="282828"/>
-                </a:solidFill>
-              </a:defRPr>
-            </a:pPr>
-            <a:r>
-              <a:t>Panel de estado de sensores y calidad de datos</a:t>
+                <a:spcPts val="800"/>
+              </a:spcAft>
+              <a:defRPr sz="1600">
+                <a:solidFill>
+                  <a:srgbClr val="282828"/>
+                </a:solidFill>
+              </a:defRPr>
+            </a:pPr>
+            <a:r>
+              <a:t>Dashboard web en tiempo real</a:t>
             </a:r>
           </a:p>
         </p:txBody>
@@ -3484,7 +3564,7 @@
               </a:defRPr>
             </a:pPr>
             <a:r>
-              <a:t>Aplicaciones Científicas y Prácticas</a:t>
+              <a:t>Control de Calidad y Trazabilidad</a:t>
             </a:r>
           </a:p>
         </p:txBody>
@@ -3506,14 +3586,17 @@
           <a:p/>
           <a:p>
             <a:pPr>
-              <a:defRPr sz="1800" b="1">
+              <a:spcAft>
+                <a:spcPts val="1000"/>
+              </a:spcAft>
+              <a:defRPr sz="2000" b="1">
                 <a:solidFill>
                   <a:srgbClr val="0099CC"/>
                 </a:solidFill>
               </a:defRPr>
             </a:pPr>
             <a:r>
-              <a:t>Investigación Oceanográfica</a:t>
+              <a:t>Quality Flags (según COI/UNESCO):</a:t>
             </a:r>
           </a:p>
           <a:p>
@@ -3521,149 +3604,150 @@
               <a:spcAft>
                 <a:spcPts val="600"/>
               </a:spcAft>
-              <a:defRPr sz="1400">
-                <a:solidFill>
-                  <a:srgbClr val="282828"/>
-                </a:solidFill>
-              </a:defRPr>
-            </a:pPr>
-            <a:r>
-              <a:t>Análisis de variabilidad oceánica, circulación costera, interacción océano-atmósfera</a:t>
-            </a:r>
-          </a:p>
-          <a:p>
-            <a:pPr>
-              <a:defRPr sz="1800" b="1">
+              <a:defRPr sz="1700">
+                <a:solidFill>
+                  <a:srgbClr val="282828"/>
+                </a:solidFill>
+              </a:defRPr>
+            </a:pPr>
+            <a:r>
+              <a:t>Flag 1: Dato verificado como bueno</a:t>
+            </a:r>
+          </a:p>
+          <a:p>
+            <a:pPr lvl="1">
+              <a:spcAft>
+                <a:spcPts val="600"/>
+              </a:spcAft>
+              <a:defRPr sz="1700">
+                <a:solidFill>
+                  <a:srgbClr val="282828"/>
+                </a:solidFill>
+              </a:defRPr>
+            </a:pPr>
+            <a:r>
+              <a:t>Flag 2: Dato probablemente bueno</a:t>
+            </a:r>
+          </a:p>
+          <a:p>
+            <a:pPr lvl="1">
+              <a:spcAft>
+                <a:spcPts val="600"/>
+              </a:spcAft>
+              <a:defRPr sz="1700">
+                <a:solidFill>
+                  <a:srgbClr val="282828"/>
+                </a:solidFill>
+              </a:defRPr>
+            </a:pPr>
+            <a:r>
+              <a:t>Flag 3: Dato sospechoso (requiere revisión)</a:t>
+            </a:r>
+          </a:p>
+          <a:p>
+            <a:pPr lvl="1">
+              <a:spcAft>
+                <a:spcPts val="600"/>
+              </a:spcAft>
+              <a:defRPr sz="1700">
+                <a:solidFill>
+                  <a:srgbClr val="282828"/>
+                </a:solidFill>
+              </a:defRPr>
+            </a:pPr>
+            <a:r>
+              <a:t>Flag 4: Dato erróneo (descartado)</a:t>
+            </a:r>
+          </a:p>
+          <a:p>
+            <a:br/>
+            <a:pPr>
+              <a:spcAft>
+                <a:spcPts val="1000"/>
+              </a:spcAft>
+              <a:defRPr sz="2000" b="1">
                 <a:solidFill>
                   <a:srgbClr val="0099CC"/>
                 </a:solidFill>
               </a:defRPr>
             </a:pPr>
             <a:r>
-              <a:t>Biología Marina</a:t>
+              <a:t>Niveles de Procesamiento:</a:t>
             </a:r>
           </a:p>
           <a:p>
             <a:pPr lvl="1">
               <a:spcAft>
-                <a:spcPts val="600"/>
-              </a:spcAft>
-              <a:defRPr sz="1400">
-                <a:solidFill>
-                  <a:srgbClr val="282828"/>
-                </a:solidFill>
-              </a:defRPr>
-            </a:pPr>
-            <a:r>
-              <a:t>Correlación con distribución de especies, productividad primaria, eventos reproductivos</a:t>
-            </a:r>
-          </a:p>
-          <a:p>
-            <a:pPr>
-              <a:defRPr sz="1800" b="1">
-                <a:solidFill>
-                  <a:srgbClr val="0099CC"/>
-                </a:solidFill>
-              </a:defRPr>
-            </a:pPr>
-            <a:r>
-              <a:t>Gestión Pesquera</a:t>
+                <a:spcPts val="400"/>
+              </a:spcAft>
+              <a:defRPr sz="1700">
+                <a:solidFill>
+                  <a:srgbClr val="282828"/>
+                </a:solidFill>
+              </a:defRPr>
+            </a:pPr>
+            <a:r>
+              <a:t>Raw (crudo)</a:t>
             </a:r>
           </a:p>
           <a:p>
             <a:pPr lvl="1">
               <a:spcAft>
-                <a:spcPts val="600"/>
-              </a:spcAft>
-              <a:defRPr sz="1400">
-                <a:solidFill>
-                  <a:srgbClr val="282828"/>
-                </a:solidFill>
-              </a:defRPr>
-            </a:pPr>
-            <a:r>
-              <a:t>Monitoreo de condiciones ambientales en zonas de pesca, predicción de eventos extremos</a:t>
-            </a:r>
-          </a:p>
-          <a:p>
-            <a:pPr>
-              <a:defRPr sz="1800" b="1">
-                <a:solidFill>
-                  <a:srgbClr val="0099CC"/>
-                </a:solidFill>
-              </a:defRPr>
-            </a:pPr>
-            <a:r>
-              <a:t>Seguridad Marítima</a:t>
+                <a:spcPts val="400"/>
+              </a:spcAft>
+              <a:defRPr sz="1700">
+                <a:solidFill>
+                  <a:srgbClr val="282828"/>
+                </a:solidFill>
+              </a:defRPr>
+            </a:pPr>
+            <a:r>
+              <a:t>QC-1 (control básico)</a:t>
             </a:r>
           </a:p>
           <a:p>
             <a:pPr lvl="1">
               <a:spcAft>
-                <a:spcPts val="600"/>
-              </a:spcAft>
-              <a:defRPr sz="1400">
-                <a:solidFill>
-                  <a:srgbClr val="282828"/>
-                </a:solidFill>
-              </a:defRPr>
-            </a:pPr>
-            <a:r>
-              <a:t>Información en tiempo real para navegación, prevención de accidentes, planificación de operaciones</a:t>
-            </a:r>
-          </a:p>
-          <a:p>
-            <a:pPr>
-              <a:defRPr sz="1800" b="1">
-                <a:solidFill>
-                  <a:srgbClr val="0099CC"/>
-                </a:solidFill>
-              </a:defRPr>
-            </a:pPr>
-            <a:r>
-              <a:t>Cambio Climático</a:t>
+                <a:spcPts val="400"/>
+              </a:spcAft>
+              <a:defRPr sz="1700">
+                <a:solidFill>
+                  <a:srgbClr val="282828"/>
+                </a:solidFill>
+              </a:defRPr>
+            </a:pPr>
+            <a:r>
+              <a:t>QC-2 (control avanzado)</a:t>
             </a:r>
           </a:p>
           <a:p>
             <a:pPr lvl="1">
               <a:spcAft>
-                <a:spcPts val="600"/>
-              </a:spcAft>
-              <a:defRPr sz="1400">
-                <a:solidFill>
-                  <a:srgbClr val="282828"/>
-                </a:solidFill>
-              </a:defRPr>
-            </a:pPr>
-            <a:r>
-              <a:t>Series temporales largas para estudios de tendencias y variabilidad</a:t>
-            </a:r>
-          </a:p>
-          <a:p>
-            <a:pPr>
-              <a:defRPr sz="1800" b="1">
-                <a:solidFill>
-                  <a:srgbClr val="0099CC"/>
-                </a:solidFill>
-              </a:defRPr>
-            </a:pPr>
-            <a:r>
-              <a:t>Educación y Divulgación</a:t>
+                <a:spcPts val="400"/>
+              </a:spcAft>
+              <a:defRPr sz="1700">
+                <a:solidFill>
+                  <a:srgbClr val="282828"/>
+                </a:solidFill>
+              </a:defRPr>
+            </a:pPr>
+            <a:r>
+              <a:t>Interpolated</a:t>
             </a:r>
           </a:p>
           <a:p>
             <a:pPr lvl="1">
               <a:spcAft>
-                <a:spcPts val="600"/>
-              </a:spcAft>
-              <a:defRPr sz="1400">
-                <a:solidFill>
-                  <a:srgbClr val="282828"/>
-                </a:solidFill>
-              </a:defRPr>
-            </a:pPr>
-            <a:r>
-              <a:t>Recurso educativo para instituciones académicas y público general</a:t>
+                <a:spcPts val="400"/>
+              </a:spcAft>
+              <a:defRPr sz="1700">
+                <a:solidFill>
+                  <a:srgbClr val="282828"/>
+                </a:solidFill>
+              </a:defRPr>
+            </a:pPr>
+            <a:r>
+              <a:t>Derived (calculado)</a:t>
             </a:r>
           </a:p>
         </p:txBody>
@@ -3709,7 +3793,7 @@
               </a:defRPr>
             </a:pPr>
             <a:r>
-              <a:t>Estado Actual del Sistema</a:t>
+              <a:t>Dashboard de Visualización Web</a:t>
             </a:r>
           </a:p>
         </p:txBody>
@@ -3741,110 +3825,112 @@
               </a:defRPr>
             </a:pPr>
             <a:r>
-              <a:t>Sistema Operativo:</a:t>
-            </a:r>
-          </a:p>
-          <a:p>
-            <a:pPr>
-              <a:spcAft>
-                <a:spcPts val="1000"/>
-              </a:spcAft>
-              <a:defRPr sz="1800">
-                <a:solidFill>
-                  <a:srgbClr val="282828"/>
-                </a:solidFill>
-              </a:defRPr>
-            </a:pPr>
-            <a:r>
-              <a:t>✓ Sistema en operación continua 24/7</a:t>
-            </a:r>
-          </a:p>
-          <a:p>
-            <a:pPr>
-              <a:spcAft>
-                <a:spcPts val="1000"/>
-              </a:spcAft>
-              <a:defRPr sz="1800">
-                <a:solidFill>
-                  <a:srgbClr val="282828"/>
-                </a:solidFill>
-              </a:defRPr>
-            </a:pPr>
-            <a:r>
-              <a:t>✓ 5 plataformas de monitoreo integradas</a:t>
-            </a:r>
-          </a:p>
-          <a:p>
-            <a:pPr>
-              <a:spcAft>
-                <a:spcPts val="1000"/>
-              </a:spcAft>
-              <a:defRPr sz="1800">
-                <a:solidFill>
-                  <a:srgbClr val="282828"/>
-                </a:solidFill>
-              </a:defRPr>
-            </a:pPr>
-            <a:r>
-              <a:t>✓ 54 variables diferentes registradas</a:t>
-            </a:r>
-          </a:p>
-          <a:p>
-            <a:pPr>
-              <a:spcAft>
-                <a:spcPts val="1000"/>
-              </a:spcAft>
-              <a:defRPr sz="1800">
-                <a:solidFill>
-                  <a:srgbClr val="282828"/>
-                </a:solidFill>
-              </a:defRPr>
-            </a:pPr>
-            <a:r>
-              <a:t>✓ Base de datos con series temporales desde 2023</a:t>
-            </a:r>
-          </a:p>
-          <a:p>
-            <a:pPr>
-              <a:spcAft>
-                <a:spcPts val="1000"/>
-              </a:spcAft>
-              <a:defRPr sz="1800">
-                <a:solidFill>
-                  <a:srgbClr val="282828"/>
-                </a:solidFill>
-              </a:defRPr>
-            </a:pPr>
-            <a:r>
-              <a:t>✓ Interfaz web accesible públicamente</a:t>
-            </a:r>
-          </a:p>
-          <a:p>
-            <a:pPr>
-              <a:spcAft>
-                <a:spcPts val="1000"/>
-              </a:spcAft>
-              <a:defRPr sz="1800">
-                <a:solidFill>
-                  <a:srgbClr val="282828"/>
-                </a:solidFill>
-              </a:defRPr>
-            </a:pPr>
-            <a:r>
-              <a:t>✓ Actualizaciones automáticas programadas</a:t>
-            </a:r>
-          </a:p>
-          <a:p>
-            <a:br/>
-            <a:pPr algn="ctr">
-              <a:defRPr sz="2000" i="1">
-                <a:solidFill>
-                  <a:srgbClr val="0099CC"/>
-                </a:solidFill>
-              </a:defRPr>
-            </a:pPr>
-            <a:r>
-              <a:t>Datos disponibles para la comunidad científica</a:t>
+              <a:t>Características del Dashboard:</a:t>
+            </a:r>
+          </a:p>
+          <a:p>
+            <a:pPr lvl="1">
+              <a:spcAft>
+                <a:spcPts val="600"/>
+              </a:spcAft>
+              <a:defRPr sz="1600">
+                <a:solidFill>
+                  <a:srgbClr val="282828"/>
+                </a:solidFill>
+              </a:defRPr>
+            </a:pPr>
+            <a:r>
+              <a:t>Gráficos interactivos de series temporales (D3.js)</a:t>
+            </a:r>
+          </a:p>
+          <a:p>
+            <a:pPr lvl="1">
+              <a:spcAft>
+                <a:spcPts val="600"/>
+              </a:spcAft>
+              <a:defRPr sz="1600">
+                <a:solidFill>
+                  <a:srgbClr val="282828"/>
+                </a:solidFill>
+              </a:defRPr>
+            </a:pPr>
+            <a:r>
+              <a:t>Mapas dinámicos con ubicación de plataformas (Leaflet + Anime.js)</a:t>
+            </a:r>
+          </a:p>
+          <a:p>
+            <a:pPr lvl="1">
+              <a:spcAft>
+                <a:spcPts val="600"/>
+              </a:spcAft>
+              <a:defRPr sz="1600">
+                <a:solidFill>
+                  <a:srgbClr val="282828"/>
+                </a:solidFill>
+              </a:defRPr>
+            </a:pPr>
+            <a:r>
+              <a:t>Visualización de datos en tiempo real</a:t>
+            </a:r>
+          </a:p>
+          <a:p>
+            <a:pPr lvl="1">
+              <a:spcAft>
+                <a:spcPts val="600"/>
+              </a:spcAft>
+              <a:defRPr sz="1600">
+                <a:solidFill>
+                  <a:srgbClr val="282828"/>
+                </a:solidFill>
+              </a:defRPr>
+            </a:pPr>
+            <a:r>
+              <a:t>Panel de supervisión del estado del sistema e ingesta</a:t>
+            </a:r>
+          </a:p>
+          <a:p>
+            <a:pPr lvl="1">
+              <a:spcAft>
+                <a:spcPts val="600"/>
+              </a:spcAft>
+              <a:defRPr sz="1600">
+                <a:solidFill>
+                  <a:srgbClr val="282828"/>
+                </a:solidFill>
+              </a:defRPr>
+            </a:pPr>
+            <a:r>
+              <a:t>Exploración de atributos técnicos y metadatos</a:t>
+            </a:r>
+          </a:p>
+          <a:p>
+            <a:pPr lvl="1">
+              <a:spcAft>
+                <a:spcPts val="600"/>
+              </a:spcAft>
+              <a:defRPr sz="1600">
+                <a:solidFill>
+                  <a:srgbClr val="282828"/>
+                </a:solidFill>
+              </a:defRPr>
+            </a:pPr>
+            <a:r>
+              <a:t>Exportación de datos (CSV, PDF)</a:t>
+            </a:r>
+          </a:p>
+          <a:p>
+            <a:pPr lvl="1">
+              <a:spcAft>
+                <a:spcPts val="600"/>
+              </a:spcAft>
+              <a:defRPr sz="1600">
+                <a:solidFill>
+                  <a:srgbClr val="282828"/>
+                </a:solidFill>
+              </a:defRPr>
+            </a:pPr>
+            <a:r>
+              <a:t>Acceso desde cualquier dispositivo (responsive design)</a:t>
             </a:r>
           </a:p>
         </p:txBody>
@@ -3890,7 +3976,7 @@
               </a:defRPr>
             </a:pPr>
             <a:r>
-              <a:t>Trabajo Futuro</a:t>
+              <a:t>Aplicaciones Científicas y Prácticas</a:t>
             </a:r>
           </a:p>
         </p:txBody>
@@ -3912,122 +3998,164 @@
           <a:p/>
           <a:p>
             <a:pPr>
-              <a:spcAft>
-                <a:spcPts val="1000"/>
-              </a:spcAft>
-              <a:defRPr sz="2200" b="1">
+              <a:defRPr sz="1700" b="1">
                 <a:solidFill>
                   <a:srgbClr val="0099CC"/>
                 </a:solidFill>
               </a:defRPr>
             </a:pPr>
             <a:r>
-              <a:t>Expansión y Mejoras Planificadas:</a:t>
+              <a:t>Oceanografía Operativa</a:t>
             </a:r>
           </a:p>
           <a:p>
             <a:pPr lvl="1">
               <a:spcAft>
-                <a:spcPts val="800"/>
-              </a:spcAft>
-              <a:defRPr sz="1800">
-                <a:solidFill>
-                  <a:srgbClr val="282828"/>
-                </a:solidFill>
-              </a:defRPr>
-            </a:pPr>
-            <a:r>
-              <a:t>Incorporación de nuevas plataformas de monitoreo</a:t>
+                <a:spcPts val="500"/>
+              </a:spcAft>
+              <a:defRPr sz="1400">
+                <a:solidFill>
+                  <a:srgbClr val="282828"/>
+                </a:solidFill>
+              </a:defRPr>
+            </a:pPr>
+            <a:r>
+              <a:t>Monitoreo continuo, predicción de eventos, circulación costera</a:t>
+            </a:r>
+          </a:p>
+          <a:p>
+            <a:pPr>
+              <a:defRPr sz="1700" b="1">
+                <a:solidFill>
+                  <a:srgbClr val="0099CC"/>
+                </a:solidFill>
+              </a:defRPr>
+            </a:pPr>
+            <a:r>
+              <a:t>Biología Marina</a:t>
             </a:r>
           </a:p>
           <a:p>
             <a:pPr lvl="1">
               <a:spcAft>
-                <a:spcPts val="800"/>
-              </a:spcAft>
-              <a:defRPr sz="1800">
-                <a:solidFill>
-                  <a:srgbClr val="282828"/>
-                </a:solidFill>
-              </a:defRPr>
-            </a:pPr>
-            <a:r>
-              <a:t>Integración de datos satelitales (SST, clorofila, vientos)</a:t>
+                <a:spcPts val="500"/>
+              </a:spcAft>
+              <a:defRPr sz="1400">
+                <a:solidFill>
+                  <a:srgbClr val="282828"/>
+                </a:solidFill>
+              </a:defRPr>
+            </a:pPr>
+            <a:r>
+              <a:t>Correlación con distribución de especies, productividad primaria</a:t>
+            </a:r>
+          </a:p>
+          <a:p>
+            <a:pPr>
+              <a:defRPr sz="1700" b="1">
+                <a:solidFill>
+                  <a:srgbClr val="0099CC"/>
+                </a:solidFill>
+              </a:defRPr>
+            </a:pPr>
+            <a:r>
+              <a:t>Economía Azul</a:t>
             </a:r>
           </a:p>
           <a:p>
             <a:pPr lvl="1">
               <a:spcAft>
-                <a:spcPts val="800"/>
-              </a:spcAft>
-              <a:defRPr sz="1800">
-                <a:solidFill>
-                  <a:srgbClr val="282828"/>
-                </a:solidFill>
-              </a:defRPr>
-            </a:pPr>
-            <a:r>
-              <a:t>Desarrollo de modelos predictivos (ML/IA)</a:t>
+                <a:spcPts val="500"/>
+              </a:spcAft>
+              <a:defRPr sz="1400">
+                <a:solidFill>
+                  <a:srgbClr val="282828"/>
+                </a:solidFill>
+              </a:defRPr>
+            </a:pPr>
+            <a:r>
+              <a:t>Información para pesca, turismo, navegación, gestión sostenible</a:t>
+            </a:r>
+          </a:p>
+          <a:p>
+            <a:pPr>
+              <a:defRPr sz="1700" b="1">
+                <a:solidFill>
+                  <a:srgbClr val="0099CC"/>
+                </a:solidFill>
+              </a:defRPr>
+            </a:pPr>
+            <a:r>
+              <a:t>Cambio Climático</a:t>
             </a:r>
           </a:p>
           <a:p>
             <a:pPr lvl="1">
               <a:spcAft>
-                <a:spcPts val="800"/>
-              </a:spcAft>
-              <a:defRPr sz="1800">
-                <a:solidFill>
-                  <a:srgbClr val="282828"/>
-                </a:solidFill>
-              </a:defRPr>
-            </a:pPr>
-            <a:r>
-              <a:t>Sistema de alertas automáticas para eventos extremos</a:t>
+                <a:spcPts val="500"/>
+              </a:spcAft>
+              <a:defRPr sz="1400">
+                <a:solidFill>
+                  <a:srgbClr val="282828"/>
+                </a:solidFill>
+              </a:defRPr>
+            </a:pPr>
+            <a:r>
+              <a:t>Series temporales largas para estudios de tendencias</a:t>
+            </a:r>
+          </a:p>
+          <a:p>
+            <a:pPr>
+              <a:defRPr sz="1700" b="1">
+                <a:solidFill>
+                  <a:srgbClr val="0099CC"/>
+                </a:solidFill>
+              </a:defRPr>
+            </a:pPr>
+            <a:r>
+              <a:t>Seguridad Marítima</a:t>
             </a:r>
           </a:p>
           <a:p>
             <a:pPr lvl="1">
               <a:spcAft>
-                <a:spcPts val="800"/>
-              </a:spcAft>
-              <a:defRPr sz="1800">
-                <a:solidFill>
-                  <a:srgbClr val="282828"/>
-                </a:solidFill>
-              </a:defRPr>
-            </a:pPr>
-            <a:r>
-              <a:t>API pública para acceso programático a datos</a:t>
+                <a:spcPts val="500"/>
+              </a:spcAft>
+              <a:defRPr sz="1400">
+                <a:solidFill>
+                  <a:srgbClr val="282828"/>
+                </a:solidFill>
+              </a:defRPr>
+            </a:pPr>
+            <a:r>
+              <a:t>Prevención de accidentes, planificación de operaciones</a:t>
+            </a:r>
+          </a:p>
+          <a:p>
+            <a:pPr>
+              <a:defRPr sz="1700" b="1">
+                <a:solidFill>
+                  <a:srgbClr val="0099CC"/>
+                </a:solidFill>
+              </a:defRPr>
+            </a:pPr>
+            <a:r>
+              <a:t>Educación y Divulgación</a:t>
             </a:r>
           </a:p>
           <a:p>
             <a:pPr lvl="1">
               <a:spcAft>
-                <a:spcPts val="800"/>
-              </a:spcAft>
-              <a:defRPr sz="1800">
-                <a:solidFill>
-                  <a:srgbClr val="282828"/>
-                </a:solidFill>
-              </a:defRPr>
-            </a:pPr>
-            <a:r>
-              <a:t>Colaboraciones con otras redes de monitoreo</a:t>
-            </a:r>
-          </a:p>
-          <a:p>
-            <a:pPr lvl="1">
-              <a:spcAft>
-                <a:spcPts val="800"/>
-              </a:spcAft>
-              <a:defRPr sz="1800">
-                <a:solidFill>
-                  <a:srgbClr val="282828"/>
-                </a:solidFill>
-              </a:defRPr>
-            </a:pPr>
-            <a:r>
-              <a:t>Expansión de cobertura geográfica</a:t>
+                <a:spcPts val="500"/>
+              </a:spcAft>
+              <a:defRPr sz="1400">
+                <a:solidFill>
+                  <a:srgbClr val="282828"/>
+                </a:solidFill>
+              </a:defRPr>
+            </a:pPr>
+            <a:r>
+              <a:t>Recurso educativo para instituciones académicas</a:t>
             </a:r>
           </a:p>
         </p:txBody>
@@ -4073,7 +4201,7 @@
               </a:defRPr>
             </a:pPr>
             <a:r>
-              <a:t>Conclusiones</a:t>
+              <a:t>Estado Actual del Sistema</a:t>
             </a:r>
           </a:p>
         </p:txBody>
@@ -4096,7 +4224,22 @@
           <a:p>
             <a:pPr>
               <a:spcAft>
-                <a:spcPts val="1200"/>
+                <a:spcPts val="1000"/>
+              </a:spcAft>
+              <a:defRPr sz="2200" b="1">
+                <a:solidFill>
+                  <a:srgbClr val="0099CC"/>
+                </a:solidFill>
+              </a:defRPr>
+            </a:pPr>
+            <a:r>
+              <a:t>Sistema Operativo:</a:t>
+            </a:r>
+          </a:p>
+          <a:p>
+            <a:pPr>
+              <a:spcAft>
+                <a:spcPts val="800"/>
               </a:spcAft>
               <a:defRPr sz="1800">
                 <a:solidFill>
@@ -4105,13 +4248,13 @@
               </a:defRPr>
             </a:pPr>
             <a:r>
-              <a:t>1. El sistema OOGSJ proporciona una infraestructura robusta para el monitoreo oceanográfico del Golfo San Jorge</a:t>
-            </a:r>
-          </a:p>
-          <a:p>
-            <a:pPr>
-              <a:spcAft>
-                <a:spcPts val="1200"/>
+              <a:t>✓ Sistema en operación continua 24/7</a:t>
+            </a:r>
+          </a:p>
+          <a:p>
+            <a:pPr>
+              <a:spcAft>
+                <a:spcPts val="800"/>
               </a:spcAft>
               <a:defRPr sz="1800">
                 <a:solidFill>
@@ -4120,13 +4263,13 @@
               </a:defRPr>
             </a:pPr>
             <a:r>
-              <a:t>2. La integración de múltiples fuentes de datos permite una visión holística del ambiente marino</a:t>
-            </a:r>
-          </a:p>
-          <a:p>
-            <a:pPr>
-              <a:spcAft>
-                <a:spcPts val="1200"/>
+              <a:t>✓ 5 plataformas de monitoreo integradas</a:t>
+            </a:r>
+          </a:p>
+          <a:p>
+            <a:pPr>
+              <a:spcAft>
+                <a:spcPts val="800"/>
               </a:spcAft>
               <a:defRPr sz="1800">
                 <a:solidFill>
@@ -4135,13 +4278,13 @@
               </a:defRPr>
             </a:pPr>
             <a:r>
-              <a:t>3. Los datos en tiempo real y las series temporales son fundamentales para investigación y gestión</a:t>
-            </a:r>
-          </a:p>
-          <a:p>
-            <a:pPr>
-              <a:spcAft>
-                <a:spcPts val="1200"/>
+              <a:t>✓ 54 variables diferentes registradas</a:t>
+            </a:r>
+          </a:p>
+          <a:p>
+            <a:pPr>
+              <a:spcAft>
+                <a:spcPts val="800"/>
               </a:spcAft>
               <a:defRPr sz="1800">
                 <a:solidFill>
@@ -4150,13 +4293,13 @@
               </a:defRPr>
             </a:pPr>
             <a:r>
-              <a:t>4. El acceso abierto facilita colaboraciones y fortalece la investigación regional</a:t>
-            </a:r>
-          </a:p>
-          <a:p>
-            <a:pPr>
-              <a:spcAft>
-                <a:spcPts val="1200"/>
+              <a:t>✓ Base de datos con series temporales desde 2023</a:t>
+            </a:r>
+          </a:p>
+          <a:p>
+            <a:pPr>
+              <a:spcAft>
+                <a:spcPts val="800"/>
               </a:spcAft>
               <a:defRPr sz="1800">
                 <a:solidFill>
@@ -4165,7 +4308,37 @@
               </a:defRPr>
             </a:pPr>
             <a:r>
-              <a:t>5. El sistema es escalable y adaptable a futuras necesidades</a:t>
+              <a:t>✓ Dashboard web accesible públicamente</a:t>
+            </a:r>
+          </a:p>
+          <a:p>
+            <a:pPr>
+              <a:spcAft>
+                <a:spcPts val="800"/>
+              </a:spcAft>
+              <a:defRPr sz="1800">
+                <a:solidFill>
+                  <a:srgbClr val="282828"/>
+                </a:solidFill>
+              </a:defRPr>
+            </a:pPr>
+            <a:r>
+              <a:t>✓ Actualizaciones automáticas programadas</a:t>
+            </a:r>
+          </a:p>
+          <a:p>
+            <a:pPr>
+              <a:spcAft>
+                <a:spcPts val="800"/>
+              </a:spcAft>
+              <a:defRPr sz="1800">
+                <a:solidFill>
+                  <a:srgbClr val="282828"/>
+                </a:solidFill>
+              </a:defRPr>
+            </a:pPr>
+            <a:r>
+              <a:t>✓ Datos abiertos para la comunidad científica</a:t>
             </a:r>
           </a:p>
         </p:txBody>
@@ -4179,6 +4352,144 @@
 </file>
 
 <file path=ppt/slides/slide15.xml><?xml version="1.0" encoding="utf-8"?>
+<p:sld xmlns:a="http://schemas.openxmlformats.org/drawingml/2006/main" xmlns:p="http://schemas.openxmlformats.org/presentationml/2006/main" xmlns:r="http://schemas.openxmlformats.org/officeDocument/2006/relationships">
+  <p:cSld>
+    <p:spTree>
+      <p:nvGrpSpPr>
+        <p:cNvPr id="1" name=""/>
+        <p:cNvGrpSpPr/>
+        <p:nvPr/>
+      </p:nvGrpSpPr>
+      <p:grpSpPr/>
+      <p:sp>
+        <p:nvSpPr>
+          <p:cNvPr id="2" name="Title 1"/>
+          <p:cNvSpPr>
+            <a:spLocks noGrp="1"/>
+          </p:cNvSpPr>
+          <p:nvPr>
+            <p:ph type="title"/>
+          </p:nvPr>
+        </p:nvSpPr>
+        <p:spPr/>
+        <p:txBody>
+          <a:bodyPr/>
+          <a:lstStyle/>
+          <a:p>
+            <a:pPr>
+              <a:defRPr sz="3200">
+                <a:solidFill>
+                  <a:srgbClr val="003366"/>
+                </a:solidFill>
+              </a:defRPr>
+            </a:pPr>
+            <a:r>
+              <a:t>Conclusiones</a:t>
+            </a:r>
+          </a:p>
+        </p:txBody>
+      </p:sp>
+      <p:sp>
+        <p:nvSpPr>
+          <p:cNvPr id="3" name="Content Placeholder 2"/>
+          <p:cNvSpPr>
+            <a:spLocks noGrp="1"/>
+          </p:cNvSpPr>
+          <p:nvPr>
+            <p:ph idx="1"/>
+          </p:nvPr>
+        </p:nvSpPr>
+        <p:spPr/>
+        <p:txBody>
+          <a:bodyPr/>
+          <a:lstStyle/>
+          <a:p/>
+          <a:p>
+            <a:pPr>
+              <a:spcAft>
+                <a:spcPts val="1000"/>
+              </a:spcAft>
+              <a:defRPr sz="1700">
+                <a:solidFill>
+                  <a:srgbClr val="282828"/>
+                </a:solidFill>
+              </a:defRPr>
+            </a:pPr>
+            <a:r>
+              <a:t>1. La plataforma modular proporciona una infraestructura robusta y replicable para el monitoreo oceanográfico</a:t>
+            </a:r>
+          </a:p>
+          <a:p>
+            <a:pPr>
+              <a:spcAft>
+                <a:spcPts val="1000"/>
+              </a:spcAft>
+              <a:defRPr sz="1700">
+                <a:solidFill>
+                  <a:srgbClr val="282828"/>
+                </a:solidFill>
+              </a:defRPr>
+            </a:pPr>
+            <a:r>
+              <a:t>2. La integración eficiente de múltiples fuentes de datos permite una visión holística del ambiente marino</a:t>
+            </a:r>
+          </a:p>
+          <a:p>
+            <a:pPr>
+              <a:spcAft>
+                <a:spcPts val="1000"/>
+              </a:spcAft>
+              <a:defRPr sz="1700">
+                <a:solidFill>
+                  <a:srgbClr val="282828"/>
+                </a:solidFill>
+              </a:defRPr>
+            </a:pPr>
+            <a:r>
+              <a:t>3. El control de calidad según estándares COI asegura trazabilidad y consistencia de las observaciones</a:t>
+            </a:r>
+          </a:p>
+          <a:p>
+            <a:pPr>
+              <a:spcAft>
+                <a:spcPts val="1000"/>
+              </a:spcAft>
+              <a:defRPr sz="1700">
+                <a:solidFill>
+                  <a:srgbClr val="282828"/>
+                </a:solidFill>
+              </a:defRPr>
+            </a:pPr>
+            <a:r>
+              <a:t>4. El acceso abierto a datos en tiempo real fortalece la investigación y la toma de decisiones</a:t>
+            </a:r>
+          </a:p>
+          <a:p>
+            <a:pPr>
+              <a:spcAft>
+                <a:spcPts val="1000"/>
+              </a:spcAft>
+              <a:defRPr sz="1700">
+                <a:solidFill>
+                  <a:srgbClr val="282828"/>
+                </a:solidFill>
+              </a:defRPr>
+            </a:pPr>
+            <a:r>
+              <a:t>5. La arquitectura contribuye a los objetivos de ROMA y respalda políticas de desarrollo sostenible en zonas costeras</a:t>
+            </a:r>
+          </a:p>
+        </p:txBody>
+      </p:sp>
+    </p:spTree>
+  </p:cSld>
+  <p:clrMapOvr>
+    <a:masterClrMapping/>
+  </p:clrMapOvr>
+</p:sld>
+</file>
+
+<file path=ppt/slides/slide16.xml><?xml version="1.0" encoding="utf-8"?>
 <p:sld xmlns:a="http://schemas.openxmlformats.org/drawingml/2006/main" xmlns:p="http://schemas.openxmlformats.org/presentationml/2006/main" xmlns:r="http://schemas.openxmlformats.org/officeDocument/2006/relationships">
   <p:cSld>
     <p:bg>
@@ -4204,7 +4515,7 @@
         </p:nvSpPr>
         <p:spPr>
           <a:xfrm>
-            <a:off x="457200" y="1371600"/>
+            <a:off x="457200" y="1097280"/>
             <a:ext cx="8229600" cy="914400"/>
           </a:xfrm>
           <a:prstGeom prst="rect">
@@ -4239,8 +4550,8 @@
         </p:nvSpPr>
         <p:spPr>
           <a:xfrm>
-            <a:off x="914400" y="2743200"/>
-            <a:ext cx="7315200" cy="2743200"/>
+            <a:off x="731520" y="2286000"/>
+            <a:ext cx="7680960" cy="3200400"/>
           </a:xfrm>
           <a:prstGeom prst="rect">
             <a:avLst/>
@@ -4256,9 +4567,39 @@
           <a:p>
             <a:pPr>
               <a:spcAft>
-                <a:spcPts val="1200"/>
-              </a:spcAft>
-              <a:defRPr sz="1800">
+                <a:spcPts val="800"/>
+              </a:spcAft>
+              <a:defRPr sz="1600">
+                <a:solidFill>
+                  <a:srgbClr val="282828"/>
+                </a:solidFill>
+              </a:defRPr>
+            </a:pPr>
+            <a:r>
+              <a:t>• Red de Observación Marina Argentina (ROMA)</a:t>
+            </a:r>
+          </a:p>
+          <a:p>
+            <a:pPr>
+              <a:spcAft>
+                <a:spcPts val="800"/>
+              </a:spcAft>
+              <a:defRPr sz="1600">
+                <a:solidFill>
+                  <a:srgbClr val="282828"/>
+                </a:solidFill>
+              </a:defRPr>
+            </a:pPr>
+            <a:r>
+              <a:t>• Instituto Argentino de Oceanografía (IADO)</a:t>
+            </a:r>
+          </a:p>
+          <a:p>
+            <a:pPr>
+              <a:spcAft>
+                <a:spcPts val="800"/>
+              </a:spcAft>
+              <a:defRPr sz="1600">
                 <a:solidFill>
                   <a:srgbClr val="282828"/>
                 </a:solidFill>
@@ -4271,9 +4612,9 @@
           <a:p>
             <a:pPr>
               <a:spcAft>
-                <a:spcPts val="1200"/>
-              </a:spcAft>
-              <a:defRPr sz="1800">
+                <a:spcPts val="800"/>
+              </a:spcAft>
+              <a:defRPr sz="1600">
                 <a:solidFill>
                   <a:srgbClr val="282828"/>
                 </a:solidFill>
@@ -4286,9 +4627,9 @@
           <a:p>
             <a:pPr>
               <a:spcAft>
-                <a:spcPts val="1200"/>
-              </a:spcAft>
-              <a:defRPr sz="1800">
+                <a:spcPts val="800"/>
+              </a:spcAft>
+              <a:defRPr sz="1600">
                 <a:solidFill>
                   <a:srgbClr val="282828"/>
                 </a:solidFill>
@@ -4301,9 +4642,9 @@
           <a:p>
             <a:pPr>
               <a:spcAft>
-                <a:spcPts val="1200"/>
-              </a:spcAft>
-              <a:defRPr sz="1800">
+                <a:spcPts val="800"/>
+              </a:spcAft>
+              <a:defRPr sz="1600">
                 <a:solidFill>
                   <a:srgbClr val="282828"/>
                 </a:solidFill>
@@ -4316,9 +4657,24 @@
           <a:p>
             <a:pPr>
               <a:spcAft>
-                <a:spcPts val="1200"/>
-              </a:spcAft>
-              <a:defRPr sz="1800">
+                <a:spcPts val="800"/>
+              </a:spcAft>
+              <a:defRPr sz="1600">
+                <a:solidFill>
+                  <a:srgbClr val="282828"/>
+                </a:solidFill>
+              </a:defRPr>
+            </a:pPr>
+            <a:r>
+              <a:t>• CONICET</a:t>
+            </a:r>
+          </a:p>
+          <a:p>
+            <a:pPr>
+              <a:spcAft>
+                <a:spcPts val="800"/>
+              </a:spcAft>
+              <a:defRPr sz="1600">
                 <a:solidFill>
                   <a:srgbClr val="282828"/>
                 </a:solidFill>
@@ -4338,7 +4694,7 @@
         </p:nvSpPr>
         <p:spPr>
           <a:xfrm>
-            <a:off x="457200" y="5943600"/>
+            <a:off x="457200" y="5760720"/>
             <a:ext cx="8229600" cy="731520"/>
           </a:xfrm>
           <a:prstGeom prst="rect">
@@ -4353,7 +4709,7 @@
           <a:lstStyle/>
           <a:p>
             <a:pPr algn="ctr">
-              <a:defRPr sz="1600">
+              <a:defRPr sz="1600" b="1">
                 <a:solidFill>
                   <a:srgbClr val="0099CC"/>
                 </a:solidFill>
@@ -4365,7 +4721,7 @@
           </a:p>
           <a:p>
             <a:r>
-              <a:t>Contacto: [correo electrónico de contacto]</a:t>
+              <a:t>Contacto: prosales@unpata.edu.ar</a:t>
             </a:r>
           </a:p>
         </p:txBody>
@@ -4411,7 +4767,7 @@
               </a:defRPr>
             </a:pPr>
             <a:r>
-              <a:t>Contexto: Golfo San Jorge</a:t>
+              <a:t>Red de Observación Marina Argentina (ROMA)</a:t>
             </a:r>
           </a:p>
         </p:txBody>
@@ -4433,77 +4789,92 @@
           <a:p/>
           <a:p>
             <a:pPr>
-              <a:spcBef>
+              <a:spcAft>
                 <a:spcPts val="1000"/>
-              </a:spcBef>
-              <a:defRPr sz="2000">
-                <a:solidFill>
-                  <a:srgbClr val="282828"/>
-                </a:solidFill>
-              </a:defRPr>
-            </a:pPr>
-            <a:r>
-              <a:t>Región de alta productividad biológica en el Atlántico Sur</a:t>
-            </a:r>
-          </a:p>
-          <a:p>
-            <a:pPr>
-              <a:spcBef>
-                <a:spcPts val="1000"/>
-              </a:spcBef>
-              <a:defRPr sz="2000">
-                <a:solidFill>
-                  <a:srgbClr val="282828"/>
-                </a:solidFill>
-              </a:defRPr>
-            </a:pPr>
-            <a:r>
-              <a:t>Zona de importancia económica: pesca, turismo, hidrocarburos</a:t>
-            </a:r>
-          </a:p>
-          <a:p>
-            <a:pPr>
-              <a:spcBef>
-                <a:spcPts val="1000"/>
-              </a:spcBef>
-              <a:defRPr sz="2000">
-                <a:solidFill>
-                  <a:srgbClr val="282828"/>
-                </a:solidFill>
-              </a:defRPr>
-            </a:pPr>
-            <a:r>
-              <a:t>Ecosistema sensible a cambios ambientales</a:t>
-            </a:r>
-          </a:p>
-          <a:p>
-            <a:pPr>
-              <a:spcBef>
-                <a:spcPts val="1000"/>
-              </a:spcBef>
-              <a:defRPr sz="2000">
-                <a:solidFill>
-                  <a:srgbClr val="282828"/>
-                </a:solidFill>
-              </a:defRPr>
-            </a:pPr>
-            <a:r>
-              <a:t>Necesidad de datos continuos para investigación y gestión</a:t>
-            </a:r>
-          </a:p>
-          <a:p>
-            <a:pPr>
-              <a:spcBef>
-                <a:spcPts val="1000"/>
-              </a:spcBef>
-              <a:defRPr sz="2000">
-                <a:solidFill>
-                  <a:srgbClr val="282828"/>
-                </a:solidFill>
-              </a:defRPr>
-            </a:pPr>
-            <a:r>
-              <a:t>Escasez histórica de datos oceanográficos in situ</a:t>
+              </a:spcAft>
+              <a:defRPr sz="2200" b="1">
+                <a:solidFill>
+                  <a:srgbClr val="0099CC"/>
+                </a:solidFill>
+              </a:defRPr>
+            </a:pPr>
+            <a:r>
+              <a:t>Contexto Institucional:</a:t>
+            </a:r>
+          </a:p>
+          <a:p>
+            <a:pPr lvl="1">
+              <a:spcAft>
+                <a:spcPts val="800"/>
+              </a:spcAft>
+              <a:defRPr sz="1800">
+                <a:solidFill>
+                  <a:srgbClr val="282828"/>
+                </a:solidFill>
+              </a:defRPr>
+            </a:pPr>
+            <a:r>
+              <a:t>Iniciativa interinstitucional para monitoreo marino de largo plazo</a:t>
+            </a:r>
+          </a:p>
+          <a:p>
+            <a:pPr lvl="1">
+              <a:spcAft>
+                <a:spcPts val="800"/>
+              </a:spcAft>
+              <a:defRPr sz="1800">
+                <a:solidFill>
+                  <a:srgbClr val="282828"/>
+                </a:solidFill>
+              </a:defRPr>
+            </a:pPr>
+            <a:r>
+              <a:t>Fortalecimiento de capacidades tecnológicas a nivel nacional</a:t>
+            </a:r>
+          </a:p>
+          <a:p>
+            <a:pPr lvl="1">
+              <a:spcAft>
+                <a:spcPts val="800"/>
+              </a:spcAft>
+              <a:defRPr sz="1800">
+                <a:solidFill>
+                  <a:srgbClr val="282828"/>
+                </a:solidFill>
+              </a:defRPr>
+            </a:pPr>
+            <a:r>
+              <a:t>Consolidación de una red de datos oceanográficos interoperables</a:t>
+            </a:r>
+          </a:p>
+          <a:p>
+            <a:pPr lvl="1">
+              <a:spcAft>
+                <a:spcPts val="800"/>
+              </a:spcAft>
+              <a:defRPr sz="1800">
+                <a:solidFill>
+                  <a:srgbClr val="282828"/>
+                </a:solidFill>
+              </a:defRPr>
+            </a:pPr>
+            <a:r>
+              <a:t>Articulación entre instituciones académicas y de investigación</a:t>
+            </a:r>
+          </a:p>
+          <a:p>
+            <a:pPr lvl="1">
+              <a:spcAft>
+                <a:spcPts val="800"/>
+              </a:spcAft>
+              <a:defRPr sz="1800">
+                <a:solidFill>
+                  <a:srgbClr val="282828"/>
+                </a:solidFill>
+              </a:defRPr>
+            </a:pPr>
+            <a:r>
+              <a:t>Este trabajo contribuye a los objetivos de ROMA en la región del Golfo San Jorge</a:t>
             </a:r>
           </a:p>
         </p:txBody>
@@ -4549,7 +4920,7 @@
               </a:defRPr>
             </a:pPr>
             <a:r>
-              <a:t>Problemática</a:t>
+              <a:t>Contexto: Golfo San Jorge y Economía Azul</a:t>
             </a:r>
           </a:p>
         </p:txBody>
@@ -4581,7 +4952,7 @@
               </a:defRPr>
             </a:pPr>
             <a:r>
-              <a:t>Datos oceanográficos fragmentados y discontinuos</a:t>
+              <a:t>Región de alta productividad biológica en el Atlántico Sur</a:t>
             </a:r>
           </a:p>
           <a:p>
@@ -4596,7 +4967,7 @@
               </a:defRPr>
             </a:pPr>
             <a:r>
-              <a:t>Falta de acceso centralizado a información en tiempo real</a:t>
+              <a:t>Zona estratégica para la economía azul: pesca, turismo, hidrocarburos</a:t>
             </a:r>
           </a:p>
           <a:p>
@@ -4611,7 +4982,7 @@
               </a:defRPr>
             </a:pPr>
             <a:r>
-              <a:t>Dificultad para estudios de series temporales largas</a:t>
+              <a:t>Ecosistema sensible a cambios ambientales y climáticos</a:t>
             </a:r>
           </a:p>
           <a:p>
@@ -4626,7 +4997,7 @@
               </a:defRPr>
             </a:pPr>
             <a:r>
-              <a:t>Limitaciones en el monitoreo de eventos extremos</a:t>
+              <a:t>Necesidad de datos continuos para investigación y gestión sostenible</a:t>
             </a:r>
           </a:p>
           <a:p>
@@ -4641,7 +5012,7 @@
               </a:defRPr>
             </a:pPr>
             <a:r>
-              <a:t>Necesidad de integrar múltiples fuentes de datos</a:t>
+              <a:t>Escasez histórica de datos oceanográficos in situ de largo plazo</a:t>
             </a:r>
           </a:p>
         </p:txBody>
@@ -4687,7 +5058,7 @@
               </a:defRPr>
             </a:pPr>
             <a:r>
-              <a:t>Objetivos del Sistema</a:t>
+              <a:t>Desafíos en el Monitoreo Marino</a:t>
             </a:r>
           </a:p>
         </p:txBody>
@@ -4709,89 +5080,77 @@
           <a:p/>
           <a:p>
             <a:pPr>
-              <a:defRPr sz="2200" b="1">
-                <a:solidFill>
-                  <a:srgbClr val="0099CC"/>
-                </a:solidFill>
-              </a:defRPr>
-            </a:pPr>
-            <a:r>
-              <a:t>Objetivo General:</a:t>
-            </a:r>
-          </a:p>
-          <a:p>
-            <a:pPr>
-              <a:spcAft>
-                <a:spcPts val="1500"/>
-              </a:spcAft>
-              <a:defRPr sz="1800">
-                <a:solidFill>
-                  <a:srgbClr val="282828"/>
-                </a:solidFill>
-              </a:defRPr>
-            </a:pPr>
-            <a:r>
-              <a:t>Desarrollar una plataforma integrada de monitoreo oceanográfico y meteorológico en tiempo real para el Golfo San Jorge</a:t>
-            </a:r>
-          </a:p>
-          <a:p>
-            <a:pPr>
-              <a:defRPr sz="2200" b="1">
-                <a:solidFill>
-                  <a:srgbClr val="0099CC"/>
-                </a:solidFill>
-              </a:defRPr>
-            </a:pPr>
-            <a:r>
-              <a:t>Objetivos Específicos:</a:t>
-            </a:r>
-          </a:p>
-          <a:p>
-            <a:pPr lvl="1">
-              <a:defRPr sz="1800">
-                <a:solidFill>
-                  <a:srgbClr val="282828"/>
-                </a:solidFill>
-              </a:defRPr>
-            </a:pPr>
-            <a:r>
-              <a:t>Integrar datos de múltiples plataformas de monitoreo</a:t>
-            </a:r>
-          </a:p>
-          <a:p>
-            <a:pPr lvl="1">
-              <a:defRPr sz="1800">
-                <a:solidFill>
-                  <a:srgbClr val="282828"/>
-                </a:solidFill>
-              </a:defRPr>
-            </a:pPr>
-            <a:r>
-              <a:t>Proporcionar acceso abierto a datos en tiempo real</a:t>
-            </a:r>
-          </a:p>
-          <a:p>
-            <a:pPr lvl="1">
-              <a:defRPr sz="1800">
-                <a:solidFill>
-                  <a:srgbClr val="282828"/>
-                </a:solidFill>
-              </a:defRPr>
-            </a:pPr>
-            <a:r>
-              <a:t>Facilitar análisis de series temporales para investigación</a:t>
-            </a:r>
-          </a:p>
-          <a:p>
-            <a:pPr lvl="1">
-              <a:defRPr sz="1800">
-                <a:solidFill>
-                  <a:srgbClr val="282828"/>
-                </a:solidFill>
-              </a:defRPr>
-            </a:pPr>
-            <a:r>
-              <a:t>Generar información para toma de decisiones</a:t>
+              <a:spcBef>
+                <a:spcPts val="1000"/>
+              </a:spcBef>
+              <a:defRPr sz="2000">
+                <a:solidFill>
+                  <a:srgbClr val="282828"/>
+                </a:solidFill>
+              </a:defRPr>
+            </a:pPr>
+            <a:r>
+              <a:t>Datos oceanográficos fragmentados y discontinuos</a:t>
+            </a:r>
+          </a:p>
+          <a:p>
+            <a:pPr>
+              <a:spcBef>
+                <a:spcPts val="1000"/>
+              </a:spcBef>
+              <a:defRPr sz="2000">
+                <a:solidFill>
+                  <a:srgbClr val="282828"/>
+                </a:solidFill>
+              </a:defRPr>
+            </a:pPr>
+            <a:r>
+              <a:t>Falta de integración eficiente entre múltiples fuentes</a:t>
+            </a:r>
+          </a:p>
+          <a:p>
+            <a:pPr>
+              <a:spcBef>
+                <a:spcPts val="1000"/>
+              </a:spcBef>
+              <a:defRPr sz="2000">
+                <a:solidFill>
+                  <a:srgbClr val="282828"/>
+                </a:solidFill>
+              </a:defRPr>
+            </a:pPr>
+            <a:r>
+              <a:t>Dificultad para estudios de series temporales largas</a:t>
+            </a:r>
+          </a:p>
+          <a:p>
+            <a:pPr>
+              <a:spcBef>
+                <a:spcPts val="1000"/>
+              </a:spcBef>
+              <a:defRPr sz="2000">
+                <a:solidFill>
+                  <a:srgbClr val="282828"/>
+                </a:solidFill>
+              </a:defRPr>
+            </a:pPr>
+            <a:r>
+              <a:t>Limitaciones en el acceso centralizado a información en tiempo real</a:t>
+            </a:r>
+          </a:p>
+          <a:p>
+            <a:pPr>
+              <a:spcBef>
+                <a:spcPts val="1000"/>
+              </a:spcBef>
+              <a:defRPr sz="2000">
+                <a:solidFill>
+                  <a:srgbClr val="282828"/>
+                </a:solidFill>
+              </a:defRPr>
+            </a:pPr>
+            <a:r>
+              <a:t>Necesidad de trazabilidad y control de calidad estandarizado</a:t>
             </a:r>
           </a:p>
         </p:txBody>
@@ -4837,7 +5196,7 @@
               </a:defRPr>
             </a:pPr>
             <a:r>
-              <a:t>Plataformas de Monitoreo Integradas</a:t>
+              <a:t>Objetivos</a:t>
             </a:r>
           </a:p>
         </p:txBody>
@@ -4859,138 +5218,89 @@
           <a:p/>
           <a:p>
             <a:pPr>
-              <a:defRPr sz="1800" b="1">
+              <a:defRPr sz="2200" b="1">
                 <a:solidFill>
                   <a:srgbClr val="0099CC"/>
                 </a:solidFill>
               </a:defRPr>
             </a:pPr>
             <a:r>
-              <a:t>Mareógrafo - Puerto Comodoro Rivadavia</a:t>
-            </a:r>
-          </a:p>
-          <a:p>
-            <a:pPr>
-              <a:spcAft>
-                <a:spcPts val="800"/>
-              </a:spcAft>
-              <a:defRPr sz="1400">
-                <a:solidFill>
-                  <a:srgbClr val="282828"/>
-                </a:solidFill>
-              </a:defRPr>
-            </a:pPr>
-            <a:r>
-              <a:t>• Sensor: Valeport TideMaster</a:t>
-            </a:r>
-            <a:br/>
-            <a:r>
-              <a:t>• Variable: Nivel del mar</a:t>
-            </a:r>
-            <a:br/>
-            <a:r>
-              <a:t>• Frecuencia: 10 minutos</a:t>
-            </a:r>
-          </a:p>
-          <a:p>
-            <a:pPr>
-              <a:defRPr sz="1800" b="1">
+              <a:t>Objetivo General:</a:t>
+            </a:r>
+          </a:p>
+          <a:p>
+            <a:pPr>
+              <a:spcAft>
+                <a:spcPts val="1500"/>
+              </a:spcAft>
+              <a:defRPr sz="1700">
+                <a:solidFill>
+                  <a:srgbClr val="282828"/>
+                </a:solidFill>
+              </a:defRPr>
+            </a:pPr>
+            <a:r>
+              <a:t>Desarrollar una plataforma modular para la ingesta, almacenamiento, procesamiento y visualización de datos oceanográficos y meteorológicos en el Golfo San Jorge</a:t>
+            </a:r>
+          </a:p>
+          <a:p>
+            <a:pPr>
+              <a:defRPr sz="2200" b="1">
                 <a:solidFill>
                   <a:srgbClr val="0099CC"/>
                 </a:solidFill>
               </a:defRPr>
             </a:pPr>
             <a:r>
-              <a:t>Boya Oceanográfica CIDMAR-2</a:t>
-            </a:r>
-          </a:p>
-          <a:p>
-            <a:pPr>
-              <a:spcAft>
-                <a:spcPts val="800"/>
-              </a:spcAft>
-              <a:defRPr sz="1400">
-                <a:solidFill>
-                  <a:srgbClr val="282828"/>
-                </a:solidFill>
-              </a:defRPr>
-            </a:pPr>
-            <a:r>
-              <a:t>• Ubicación: 45.877°S, 67.442°W</a:t>
-            </a:r>
-            <a:br/>
-            <a:r>
-              <a:t>• Variables: Olas, corrientes, radiación PAR</a:t>
-            </a:r>
-            <a:br/>
-            <a:r>
-              <a:t>• Frecuencia: Horaria</a:t>
-            </a:r>
-          </a:p>
-          <a:p>
-            <a:pPr>
-              <a:defRPr sz="1800" b="1">
-                <a:solidFill>
-                  <a:srgbClr val="0099CC"/>
-                </a:solidFill>
-              </a:defRPr>
-            </a:pPr>
-            <a:r>
-              <a:t>Estaciones Meteorológicas (WeatherLink)</a:t>
-            </a:r>
-          </a:p>
-          <a:p>
-            <a:pPr>
-              <a:spcAft>
-                <a:spcPts val="800"/>
-              </a:spcAft>
-              <a:defRPr sz="1400">
-                <a:solidFill>
-                  <a:srgbClr val="282828"/>
-                </a:solidFill>
-              </a:defRPr>
-            </a:pPr>
-            <a:r>
-              <a:t>• Puerto CR y Caleta Córdova</a:t>
-            </a:r>
-            <a:br/>
-            <a:r>
-              <a:t>• Variables: T, P, viento, precipitación, UV</a:t>
-            </a:r>
-            <a:br/>
-            <a:r>
-              <a:t>• Frecuencia: 10 minutos</a:t>
-            </a:r>
-          </a:p>
-          <a:p>
-            <a:pPr>
-              <a:defRPr sz="1800" b="1">
-                <a:solidFill>
-                  <a:srgbClr val="0099CC"/>
-                </a:solidFill>
-              </a:defRPr>
-            </a:pPr>
-            <a:r>
-              <a:t>Modelo de Predicción de Mareas</a:t>
-            </a:r>
-          </a:p>
-          <a:p>
-            <a:pPr>
-              <a:spcAft>
-                <a:spcPts val="800"/>
-              </a:spcAft>
-              <a:defRPr sz="1400">
-                <a:solidFill>
-                  <a:srgbClr val="282828"/>
-                </a:solidFill>
-              </a:defRPr>
-            </a:pPr>
-            <a:r>
-              <a:t>• Servicio Hidrográfico Naval</a:t>
-            </a:r>
-            <a:br/>
-            <a:r>
-              <a:t>• Actualización: Cada 6 horas</a:t>
+              <a:t>Objetivos Específicos:</a:t>
+            </a:r>
+          </a:p>
+          <a:p>
+            <a:pPr lvl="1">
+              <a:defRPr sz="1700">
+                <a:solidFill>
+                  <a:srgbClr val="282828"/>
+                </a:solidFill>
+              </a:defRPr>
+            </a:pPr>
+            <a:r>
+              <a:t>Integrar datos de múltiples plataformas distribuidas</a:t>
+            </a:r>
+          </a:p>
+          <a:p>
+            <a:pPr lvl="1">
+              <a:defRPr sz="1700">
+                <a:solidFill>
+                  <a:srgbClr val="282828"/>
+                </a:solidFill>
+              </a:defRPr>
+            </a:pPr>
+            <a:r>
+              <a:t>Asegurar trazabilidad y control de calidad según estándares COI</a:t>
+            </a:r>
+          </a:p>
+          <a:p>
+            <a:pPr lvl="1">
+              <a:defRPr sz="1700">
+                <a:solidFill>
+                  <a:srgbClr val="282828"/>
+                </a:solidFill>
+              </a:defRPr>
+            </a:pPr>
+            <a:r>
+              <a:t>Proporcionar acceso abierto a datos en tiempo real</a:t>
+            </a:r>
+          </a:p>
+          <a:p>
+            <a:pPr lvl="1">
+              <a:defRPr sz="1700">
+                <a:solidFill>
+                  <a:srgbClr val="282828"/>
+                </a:solidFill>
+              </a:defRPr>
+            </a:pPr>
+            <a:r>
+              <a:t>Respaldar políticas de desarrollo sostenible en zonas costeras</a:t>
             </a:r>
           </a:p>
         </p:txBody>
@@ -5036,7 +5346,7 @@
               </a:defRPr>
             </a:pPr>
             <a:r>
-              <a:t>Variables Oceanográficas Medidas</a:t>
+              <a:t>Plataformas de Monitoreo Integradas</a:t>
             </a:r>
           </a:p>
         </p:txBody>
@@ -5058,20 +5368,20 @@
           <a:p/>
           <a:p>
             <a:pPr>
-              <a:defRPr sz="1800" b="1">
+              <a:defRPr sz="1700" b="1">
                 <a:solidFill>
                   <a:srgbClr val="0099CC"/>
                 </a:solidFill>
               </a:defRPr>
             </a:pPr>
             <a:r>
-              <a:t>Altura de Olas (Metros (m))</a:t>
-            </a:r>
-          </a:p>
-          <a:p>
-            <a:pPr lvl="1">
-              <a:spcAft>
-                <a:spcPts val="500"/>
+              <a:t>Estaciones Meteorológicas Davis</a:t>
+            </a:r>
+          </a:p>
+          <a:p>
+            <a:pPr>
+              <a:spcAft>
+                <a:spcPts val="600"/>
               </a:spcAft>
               <a:defRPr sz="1400">
                 <a:solidFill>
@@ -5080,25 +5390,33 @@
               </a:defRPr>
             </a:pPr>
             <a:r>
-              <a:t>  Fuente: Boya CIDMAR-2</a:t>
-            </a:r>
-          </a:p>
-          <a:p>
-            <a:pPr>
-              <a:defRPr sz="1800" b="1">
+              <a:t>• Puerto CR y Caleta Córdova (APPCR)</a:t>
+            </a:r>
+            <a:br/>
+            <a:r>
+              <a:t>• Variables: T, P, viento, precipitación, UV</a:t>
+            </a:r>
+            <a:br/>
+            <a:r>
+              <a:t>• Frecuencia: 10 minutos</a:t>
+            </a:r>
+          </a:p>
+          <a:p>
+            <a:pPr>
+              <a:defRPr sz="1700" b="1">
                 <a:solidFill>
                   <a:srgbClr val="0099CC"/>
                 </a:solidFill>
               </a:defRPr>
             </a:pPr>
             <a:r>
-              <a:t>Periodo de Olas (Segundos (s))</a:t>
-            </a:r>
-          </a:p>
-          <a:p>
-            <a:pPr lvl="1">
-              <a:spcAft>
-                <a:spcPts val="500"/>
+              <a:t>Mareógrafo - Puerto Comodoro Rivadavia</a:t>
+            </a:r>
+          </a:p>
+          <a:p>
+            <a:pPr>
+              <a:spcAft>
+                <a:spcPts val="600"/>
               </a:spcAft>
               <a:defRPr sz="1400">
                 <a:solidFill>
@@ -5107,25 +5425,33 @@
               </a:defRPr>
             </a:pPr>
             <a:r>
-              <a:t>  Fuente: Boya CIDMAR-2</a:t>
-            </a:r>
-          </a:p>
-          <a:p>
-            <a:pPr>
-              <a:defRPr sz="1800" b="1">
+              <a:t>• Sensor: Valeport TideMaster</a:t>
+            </a:r>
+            <a:br/>
+            <a:r>
+              <a:t>• Variable: Nivel del mar</a:t>
+            </a:r>
+            <a:br/>
+            <a:r>
+              <a:t>• Frecuencia: 10 minutos</a:t>
+            </a:r>
+          </a:p>
+          <a:p>
+            <a:pPr>
+              <a:defRPr sz="1700" b="1">
                 <a:solidFill>
                   <a:srgbClr val="0099CC"/>
                 </a:solidFill>
               </a:defRPr>
             </a:pPr>
             <a:r>
-              <a:t>Dirección de Olas (Grados (°))</a:t>
-            </a:r>
-          </a:p>
-          <a:p>
-            <a:pPr lvl="1">
-              <a:spcAft>
-                <a:spcPts val="500"/>
+              <a:t>Boya Oceanográfica CIDMAR-2</a:t>
+            </a:r>
+          </a:p>
+          <a:p>
+            <a:pPr>
+              <a:spcAft>
+                <a:spcPts val="600"/>
               </a:spcAft>
               <a:defRPr sz="1400">
                 <a:solidFill>
@@ -5134,25 +5460,33 @@
               </a:defRPr>
             </a:pPr>
             <a:r>
-              <a:t>  Fuente: Boya CIDMAR-2</a:t>
-            </a:r>
-          </a:p>
-          <a:p>
-            <a:pPr>
-              <a:defRPr sz="1800" b="1">
+              <a:t>• Ubicación: 45.877°S, 67.442°W</a:t>
+            </a:r>
+            <a:br/>
+            <a:r>
+              <a:t>• Variables: Olas, corrientes, radiación PAR</a:t>
+            </a:r>
+            <a:br/>
+            <a:r>
+              <a:t>• Frecuencia: Horaria</a:t>
+            </a:r>
+          </a:p>
+          <a:p>
+            <a:pPr>
+              <a:defRPr sz="1700" b="1">
                 <a:solidFill>
                   <a:srgbClr val="0099CC"/>
                 </a:solidFill>
               </a:defRPr>
             </a:pPr>
             <a:r>
-              <a:t>Velocidad de Corriente (m/s)</a:t>
-            </a:r>
-          </a:p>
-          <a:p>
-            <a:pPr lvl="1">
-              <a:spcAft>
-                <a:spcPts val="500"/>
+              <a:t>Modelo de Predicción de Mareas</a:t>
+            </a:r>
+          </a:p>
+          <a:p>
+            <a:pPr>
+              <a:spcAft>
+                <a:spcPts val="600"/>
               </a:spcAft>
               <a:defRPr sz="1400">
                 <a:solidFill>
@@ -5161,88 +5495,24 @@
               </a:defRPr>
             </a:pPr>
             <a:r>
-              <a:t>  Fuente: Boya CIDMAR-2</a:t>
-            </a:r>
-          </a:p>
-          <a:p>
-            <a:pPr>
-              <a:defRPr sz="1800" b="1">
-                <a:solidFill>
-                  <a:srgbClr val="0099CC"/>
-                </a:solidFill>
-              </a:defRPr>
-            </a:pPr>
-            <a:r>
-              <a:t>Dirección de Corriente (Grados (°))</a:t>
-            </a:r>
-          </a:p>
-          <a:p>
-            <a:pPr lvl="1">
-              <a:spcAft>
-                <a:spcPts val="500"/>
-              </a:spcAft>
-              <a:defRPr sz="1400">
-                <a:solidFill>
-                  <a:srgbClr val="282828"/>
-                </a:solidFill>
-              </a:defRPr>
-            </a:pPr>
-            <a:r>
-              <a:t>  Fuente: Boya CIDMAR-2</a:t>
-            </a:r>
-          </a:p>
-          <a:p>
-            <a:pPr>
-              <a:defRPr sz="1800" b="1">
-                <a:solidFill>
-                  <a:srgbClr val="0099CC"/>
-                </a:solidFill>
-              </a:defRPr>
-            </a:pPr>
-            <a:r>
-              <a:t>Radiación PAR (µmol/m²/s)</a:t>
-            </a:r>
-          </a:p>
-          <a:p>
-            <a:pPr lvl="1">
-              <a:spcAft>
-                <a:spcPts val="500"/>
-              </a:spcAft>
-              <a:defRPr sz="1400">
-                <a:solidFill>
-                  <a:srgbClr val="282828"/>
-                </a:solidFill>
-              </a:defRPr>
-            </a:pPr>
-            <a:r>
-              <a:t>  Fuente: Boya CIDMAR-2</a:t>
-            </a:r>
-          </a:p>
-          <a:p>
-            <a:pPr>
-              <a:defRPr sz="1800" b="1">
-                <a:solidFill>
-                  <a:srgbClr val="0099CC"/>
-                </a:solidFill>
-              </a:defRPr>
-            </a:pPr>
-            <a:r>
-              <a:t>Nivel del Mar (Metros (m))</a:t>
-            </a:r>
-          </a:p>
-          <a:p>
-            <a:pPr lvl="1">
-              <a:spcAft>
-                <a:spcPts val="500"/>
-              </a:spcAft>
-              <a:defRPr sz="1400">
-                <a:solidFill>
-                  <a:srgbClr val="282828"/>
-                </a:solidFill>
-              </a:defRPr>
-            </a:pPr>
-            <a:r>
-              <a:t>  Fuente: Mareógrafo</a:t>
+              <a:t>• Servicio Hidrográfico Naval</a:t>
+            </a:r>
+            <a:br/>
+            <a:r>
+              <a:t>• Actualización: Cada 6 horas</a:t>
+            </a:r>
+          </a:p>
+          <a:p>
+            <a:br/>
+            <a:pPr>
+              <a:defRPr sz="1200" i="1">
+                <a:solidFill>
+                  <a:srgbClr val="006699"/>
+                </a:solidFill>
+              </a:defRPr>
+            </a:pPr>
+            <a:r>
+              <a:t>* Datos adquiridos mediante APIs provistas por IADO</a:t>
             </a:r>
           </a:p>
         </p:txBody>
@@ -5288,7 +5558,7 @@
               </a:defRPr>
             </a:pPr>
             <a:r>
-              <a:t>Variables Meteorológicas Medidas</a:t>
+              <a:t>Variables Oceanográficas Medidas</a:t>
             </a:r>
           </a:p>
         </p:txBody>
@@ -5308,262 +5578,193 @@
           <a:bodyPr/>
           <a:lstStyle/>
           <a:p/>
-        </p:txBody>
-      </p:sp>
-      <p:sp>
-        <p:nvSpPr>
-          <p:cNvPr id="4" name="TextBox 3"/>
-          <p:cNvSpPr txBox="1"/>
-          <p:nvPr/>
-        </p:nvSpPr>
-        <p:spPr>
-          <a:xfrm>
-            <a:off x="457200" y="1371600"/>
-            <a:ext cx="4114800" cy="5029200"/>
-          </a:xfrm>
-          <a:prstGeom prst="rect">
-            <a:avLst/>
-          </a:prstGeom>
-          <a:noFill/>
-        </p:spPr>
-        <p:txBody>
-          <a:bodyPr wrap="square">
-            <a:spAutoFit/>
-          </a:bodyPr>
-          <a:lstStyle/>
-          <a:p/>
-          <a:p>
-            <a:pPr>
-              <a:spcAft>
-                <a:spcPts val="800"/>
-              </a:spcAft>
-              <a:defRPr sz="1600">
-                <a:solidFill>
-                  <a:srgbClr val="282828"/>
-                </a:solidFill>
-              </a:defRPr>
-            </a:pPr>
-            <a:r>
-              <a:t>• Temperatura del aire</a:t>
-            </a:r>
-          </a:p>
-          <a:p>
-            <a:pPr>
-              <a:spcAft>
-                <a:spcPts val="800"/>
-              </a:spcAft>
-              <a:defRPr sz="1600">
-                <a:solidFill>
-                  <a:srgbClr val="282828"/>
-                </a:solidFill>
-              </a:defRPr>
-            </a:pPr>
-            <a:r>
-              <a:t>• Humedad relativa</a:t>
-            </a:r>
-          </a:p>
-          <a:p>
-            <a:pPr>
-              <a:spcAft>
-                <a:spcPts val="800"/>
-              </a:spcAft>
-              <a:defRPr sz="1600">
-                <a:solidFill>
-                  <a:srgbClr val="282828"/>
-                </a:solidFill>
-              </a:defRPr>
-            </a:pPr>
-            <a:r>
-              <a:t>• Presión barométrica</a:t>
-            </a:r>
-          </a:p>
-          <a:p>
-            <a:pPr>
-              <a:spcAft>
-                <a:spcPts val="800"/>
-              </a:spcAft>
-              <a:defRPr sz="1600">
-                <a:solidFill>
-                  <a:srgbClr val="282828"/>
-                </a:solidFill>
-              </a:defRPr>
-            </a:pPr>
-            <a:r>
-              <a:t>• Velocidad del viento</a:t>
-            </a:r>
-          </a:p>
-          <a:p>
-            <a:pPr>
-              <a:spcAft>
-                <a:spcPts val="800"/>
-              </a:spcAft>
-              <a:defRPr sz="1600">
-                <a:solidFill>
-                  <a:srgbClr val="282828"/>
-                </a:solidFill>
-              </a:defRPr>
-            </a:pPr>
-            <a:r>
-              <a:t>• Dirección del viento</a:t>
-            </a:r>
-          </a:p>
-          <a:p>
-            <a:pPr>
-              <a:spcAft>
-                <a:spcPts val="800"/>
-              </a:spcAft>
-              <a:defRPr sz="1600">
-                <a:solidFill>
-                  <a:srgbClr val="282828"/>
-                </a:solidFill>
-              </a:defRPr>
-            </a:pPr>
-            <a:r>
-              <a:t>• Precipitación acumulada</a:t>
-            </a:r>
-          </a:p>
-          <a:p>
-            <a:pPr>
-              <a:spcAft>
-                <a:spcPts val="800"/>
-              </a:spcAft>
-              <a:defRPr sz="1600">
-                <a:solidFill>
-                  <a:srgbClr val="282828"/>
-                </a:solidFill>
-              </a:defRPr>
-            </a:pPr>
-            <a:r>
-              <a:t>• Tasa de precipitación</a:t>
-            </a:r>
-          </a:p>
-        </p:txBody>
-      </p:sp>
-      <p:sp>
-        <p:nvSpPr>
-          <p:cNvPr id="5" name="TextBox 4"/>
-          <p:cNvSpPr txBox="1"/>
-          <p:nvPr/>
-        </p:nvSpPr>
-        <p:spPr>
-          <a:xfrm>
-            <a:off x="4572000" y="1371600"/>
-            <a:ext cx="4114800" cy="5029200"/>
-          </a:xfrm>
-          <a:prstGeom prst="rect">
-            <a:avLst/>
-          </a:prstGeom>
-          <a:noFill/>
-        </p:spPr>
-        <p:txBody>
-          <a:bodyPr wrap="square">
-            <a:spAutoFit/>
-          </a:bodyPr>
-          <a:lstStyle/>
-          <a:p/>
-          <a:p>
-            <a:pPr>
-              <a:spcAft>
-                <a:spcPts val="800"/>
-              </a:spcAft>
-              <a:defRPr sz="1600">
-                <a:solidFill>
-                  <a:srgbClr val="282828"/>
-                </a:solidFill>
-              </a:defRPr>
-            </a:pPr>
-            <a:r>
-              <a:t>• Punto de rocío</a:t>
-            </a:r>
-          </a:p>
-          <a:p>
-            <a:pPr>
-              <a:spcAft>
-                <a:spcPts val="800"/>
-              </a:spcAft>
-              <a:defRPr sz="1600">
-                <a:solidFill>
-                  <a:srgbClr val="282828"/>
-                </a:solidFill>
-              </a:defRPr>
-            </a:pPr>
-            <a:r>
-              <a:t>• Índice de calor</a:t>
-            </a:r>
-          </a:p>
-          <a:p>
-            <a:pPr>
-              <a:spcAft>
-                <a:spcPts val="800"/>
-              </a:spcAft>
-              <a:defRPr sz="1600">
-                <a:solidFill>
-                  <a:srgbClr val="282828"/>
-                </a:solidFill>
-              </a:defRPr>
-            </a:pPr>
-            <a:r>
-              <a:t>• Sensación térmica</a:t>
-            </a:r>
-          </a:p>
-          <a:p>
-            <a:pPr>
-              <a:spcAft>
-                <a:spcPts val="800"/>
-              </a:spcAft>
-              <a:defRPr sz="1600">
-                <a:solidFill>
-                  <a:srgbClr val="282828"/>
-                </a:solidFill>
-              </a:defRPr>
-            </a:pPr>
-            <a:r>
-              <a:t>• Radiación solar</a:t>
-            </a:r>
-          </a:p>
-          <a:p>
-            <a:pPr>
-              <a:spcAft>
-                <a:spcPts val="800"/>
-              </a:spcAft>
-              <a:defRPr sz="1600">
-                <a:solidFill>
-                  <a:srgbClr val="282828"/>
-                </a:solidFill>
-              </a:defRPr>
-            </a:pPr>
-            <a:r>
-              <a:t>• Índice UV</a:t>
-            </a:r>
-          </a:p>
-          <a:p>
-            <a:pPr>
-              <a:spcAft>
-                <a:spcPts val="800"/>
-              </a:spcAft>
-              <a:defRPr sz="1600">
-                <a:solidFill>
-                  <a:srgbClr val="282828"/>
-                </a:solidFill>
-              </a:defRPr>
-            </a:pPr>
-            <a:r>
-              <a:t>• Evapotranspiración</a:t>
-            </a:r>
-          </a:p>
-          <a:p>
-            <a:pPr>
-              <a:spcAft>
-                <a:spcPts val="800"/>
-              </a:spcAft>
-              <a:defRPr sz="1600">
-                <a:solidFill>
-                  <a:srgbClr val="282828"/>
-                </a:solidFill>
-              </a:defRPr>
-            </a:pPr>
-            <a:r>
-              <a:t>• Cobertura nubosa</a:t>
+          <a:p>
+            <a:pPr>
+              <a:defRPr sz="1800" b="1">
+                <a:solidFill>
+                  <a:srgbClr val="0099CC"/>
+                </a:solidFill>
+              </a:defRPr>
+            </a:pPr>
+            <a:r>
+              <a:t>Altura de Olas (m)</a:t>
+            </a:r>
+          </a:p>
+          <a:p>
+            <a:pPr lvl="1">
+              <a:spcAft>
+                <a:spcPts val="400"/>
+              </a:spcAft>
+              <a:defRPr sz="1400">
+                <a:solidFill>
+                  <a:srgbClr val="282828"/>
+                </a:solidFill>
+              </a:defRPr>
+            </a:pPr>
+            <a:r>
+              <a:t>  Fuente: Boya CIDMAR-2</a:t>
+            </a:r>
+          </a:p>
+          <a:p>
+            <a:pPr>
+              <a:defRPr sz="1800" b="1">
+                <a:solidFill>
+                  <a:srgbClr val="0099CC"/>
+                </a:solidFill>
+              </a:defRPr>
+            </a:pPr>
+            <a:r>
+              <a:t>Periodo de Olas (s)</a:t>
+            </a:r>
+          </a:p>
+          <a:p>
+            <a:pPr lvl="1">
+              <a:spcAft>
+                <a:spcPts val="400"/>
+              </a:spcAft>
+              <a:defRPr sz="1400">
+                <a:solidFill>
+                  <a:srgbClr val="282828"/>
+                </a:solidFill>
+              </a:defRPr>
+            </a:pPr>
+            <a:r>
+              <a:t>  Fuente: Boya CIDMAR-2</a:t>
+            </a:r>
+          </a:p>
+          <a:p>
+            <a:pPr>
+              <a:defRPr sz="1800" b="1">
+                <a:solidFill>
+                  <a:srgbClr val="0099CC"/>
+                </a:solidFill>
+              </a:defRPr>
+            </a:pPr>
+            <a:r>
+              <a:t>Dirección de Olas (°)</a:t>
+            </a:r>
+          </a:p>
+          <a:p>
+            <a:pPr lvl="1">
+              <a:spcAft>
+                <a:spcPts val="400"/>
+              </a:spcAft>
+              <a:defRPr sz="1400">
+                <a:solidFill>
+                  <a:srgbClr val="282828"/>
+                </a:solidFill>
+              </a:defRPr>
+            </a:pPr>
+            <a:r>
+              <a:t>  Fuente: Boya CIDMAR-2</a:t>
+            </a:r>
+          </a:p>
+          <a:p>
+            <a:pPr>
+              <a:defRPr sz="1800" b="1">
+                <a:solidFill>
+                  <a:srgbClr val="0099CC"/>
+                </a:solidFill>
+              </a:defRPr>
+            </a:pPr>
+            <a:r>
+              <a:t>Velocidad de Corriente (m/s)</a:t>
+            </a:r>
+          </a:p>
+          <a:p>
+            <a:pPr lvl="1">
+              <a:spcAft>
+                <a:spcPts val="400"/>
+              </a:spcAft>
+              <a:defRPr sz="1400">
+                <a:solidFill>
+                  <a:srgbClr val="282828"/>
+                </a:solidFill>
+              </a:defRPr>
+            </a:pPr>
+            <a:r>
+              <a:t>  Fuente: Boya CIDMAR-2</a:t>
+            </a:r>
+          </a:p>
+          <a:p>
+            <a:pPr>
+              <a:defRPr sz="1800" b="1">
+                <a:solidFill>
+                  <a:srgbClr val="0099CC"/>
+                </a:solidFill>
+              </a:defRPr>
+            </a:pPr>
+            <a:r>
+              <a:t>Dirección de Corriente (°)</a:t>
+            </a:r>
+          </a:p>
+          <a:p>
+            <a:pPr lvl="1">
+              <a:spcAft>
+                <a:spcPts val="400"/>
+              </a:spcAft>
+              <a:defRPr sz="1400">
+                <a:solidFill>
+                  <a:srgbClr val="282828"/>
+                </a:solidFill>
+              </a:defRPr>
+            </a:pPr>
+            <a:r>
+              <a:t>  Fuente: Boya CIDMAR-2</a:t>
+            </a:r>
+          </a:p>
+          <a:p>
+            <a:pPr>
+              <a:defRPr sz="1800" b="1">
+                <a:solidFill>
+                  <a:srgbClr val="0099CC"/>
+                </a:solidFill>
+              </a:defRPr>
+            </a:pPr>
+            <a:r>
+              <a:t>Radiación PAR (µmol/m²/s)</a:t>
+            </a:r>
+          </a:p>
+          <a:p>
+            <a:pPr lvl="1">
+              <a:spcAft>
+                <a:spcPts val="400"/>
+              </a:spcAft>
+              <a:defRPr sz="1400">
+                <a:solidFill>
+                  <a:srgbClr val="282828"/>
+                </a:solidFill>
+              </a:defRPr>
+            </a:pPr>
+            <a:r>
+              <a:t>  Fuente: Boya CIDMAR-2</a:t>
+            </a:r>
+          </a:p>
+          <a:p>
+            <a:pPr>
+              <a:defRPr sz="1800" b="1">
+                <a:solidFill>
+                  <a:srgbClr val="0099CC"/>
+                </a:solidFill>
+              </a:defRPr>
+            </a:pPr>
+            <a:r>
+              <a:t>Nivel del Mar (m)</a:t>
+            </a:r>
+          </a:p>
+          <a:p>
+            <a:pPr lvl="1">
+              <a:spcAft>
+                <a:spcPts val="400"/>
+              </a:spcAft>
+              <a:defRPr sz="1400">
+                <a:solidFill>
+                  <a:srgbClr val="282828"/>
+                </a:solidFill>
+              </a:defRPr>
+            </a:pPr>
+            <a:r>
+              <a:t>  Fuente: Mareógrafo</a:t>
             </a:r>
           </a:p>
         </p:txBody>
@@ -5609,7 +5810,7 @@
               </a:defRPr>
             </a:pPr>
             <a:r>
-              <a:t>Arquitectura del Sistema</a:t>
+              <a:t>Variables Meteorológicas Medidas</a:t>
             </a:r>
           </a:p>
         </p:txBody>
@@ -5629,115 +5830,262 @@
           <a:bodyPr/>
           <a:lstStyle/>
           <a:p/>
-          <a:p>
-            <a:pPr>
-              <a:spcAft>
-                <a:spcPts val="1000"/>
-              </a:spcAft>
-              <a:defRPr sz="2200" b="1">
-                <a:solidFill>
-                  <a:srgbClr val="0099CC"/>
-                </a:solidFill>
-              </a:defRPr>
-            </a:pPr>
-            <a:r>
-              <a:t>Flujo de Datos:</a:t>
-            </a:r>
-          </a:p>
-          <a:p>
-            <a:pPr>
-              <a:spcAft>
-                <a:spcPts val="1200"/>
-              </a:spcAft>
-              <a:defRPr sz="1800">
-                <a:solidFill>
-                  <a:srgbClr val="282828"/>
-                </a:solidFill>
-              </a:defRPr>
-            </a:pPr>
-            <a:r>
-              <a:t>1. Adquisición: APIs externas y sensores remotos</a:t>
-            </a:r>
-          </a:p>
-          <a:p>
-            <a:pPr>
-              <a:spcAft>
-                <a:spcPts val="1200"/>
-              </a:spcAft>
-              <a:defRPr sz="1800">
-                <a:solidFill>
-                  <a:srgbClr val="282828"/>
-                </a:solidFill>
-              </a:defRPr>
-            </a:pPr>
-            <a:r>
-              <a:t>2. Procesamiento: Validación y control de calidad (QC)</a:t>
-            </a:r>
-          </a:p>
-          <a:p>
-            <a:pPr>
-              <a:spcAft>
-                <a:spcPts val="1200"/>
-              </a:spcAft>
-              <a:defRPr sz="1800">
-                <a:solidFill>
-                  <a:srgbClr val="282828"/>
-                </a:solidFill>
-              </a:defRPr>
-            </a:pPr>
-            <a:r>
-              <a:t>3. Almacenamiento: Base de datos PostgreSQL con estándares COI</a:t>
-            </a:r>
-          </a:p>
-          <a:p>
-            <a:pPr>
-              <a:spcAft>
-                <a:spcPts val="1200"/>
-              </a:spcAft>
-              <a:defRPr sz="1800">
-                <a:solidFill>
-                  <a:srgbClr val="282828"/>
-                </a:solidFill>
-              </a:defRPr>
-            </a:pPr>
-            <a:r>
-              <a:t>4. Visualización: Interfaz web con gráficos interactivos</a:t>
-            </a:r>
-          </a:p>
-          <a:p>
-            <a:pPr>
-              <a:spcAft>
-                <a:spcPts val="1200"/>
-              </a:spcAft>
-              <a:defRPr sz="1800">
-                <a:solidFill>
-                  <a:srgbClr val="282828"/>
-                </a:solidFill>
-              </a:defRPr>
-            </a:pPr>
-            <a:r>
-              <a:t>5. Acceso: API REST para consultas y exportación de datos</a:t>
-            </a:r>
-          </a:p>
-          <a:p>
-            <a:br/>
-            <a:pPr>
+        </p:txBody>
+      </p:sp>
+      <p:sp>
+        <p:nvSpPr>
+          <p:cNvPr id="4" name="TextBox 3"/>
+          <p:cNvSpPr txBox="1"/>
+          <p:nvPr/>
+        </p:nvSpPr>
+        <p:spPr>
+          <a:xfrm>
+            <a:off x="457200" y="1371600"/>
+            <a:ext cx="4114800" cy="5029200"/>
+          </a:xfrm>
+          <a:prstGeom prst="rect">
+            <a:avLst/>
+          </a:prstGeom>
+          <a:noFill/>
+        </p:spPr>
+        <p:txBody>
+          <a:bodyPr wrap="square">
+            <a:spAutoFit/>
+          </a:bodyPr>
+          <a:lstStyle/>
+          <a:p/>
+          <a:p>
+            <a:pPr>
+              <a:spcAft>
+                <a:spcPts val="800"/>
+              </a:spcAft>
               <a:defRPr sz="1600">
                 <a:solidFill>
-                  <a:srgbClr val="0099CC"/>
-                </a:solidFill>
-              </a:defRPr>
-            </a:pPr>
-            <a:r>
-              <a:t>✓ Actualización automática programada</a:t>
-            </a:r>
-            <a:br/>
-            <a:r>
-              <a:t>✓ Sistema operativo 24/7</a:t>
-            </a:r>
-            <a:br/>
-            <a:r>
-              <a:t>✓ Datos abiertos y accesibles</a:t>
+                  <a:srgbClr val="282828"/>
+                </a:solidFill>
+              </a:defRPr>
+            </a:pPr>
+            <a:r>
+              <a:t>• Temperatura del aire</a:t>
+            </a:r>
+          </a:p>
+          <a:p>
+            <a:pPr>
+              <a:spcAft>
+                <a:spcPts val="800"/>
+              </a:spcAft>
+              <a:defRPr sz="1600">
+                <a:solidFill>
+                  <a:srgbClr val="282828"/>
+                </a:solidFill>
+              </a:defRPr>
+            </a:pPr>
+            <a:r>
+              <a:t>• Humedad relativa</a:t>
+            </a:r>
+          </a:p>
+          <a:p>
+            <a:pPr>
+              <a:spcAft>
+                <a:spcPts val="800"/>
+              </a:spcAft>
+              <a:defRPr sz="1600">
+                <a:solidFill>
+                  <a:srgbClr val="282828"/>
+                </a:solidFill>
+              </a:defRPr>
+            </a:pPr>
+            <a:r>
+              <a:t>• Presión barométrica</a:t>
+            </a:r>
+          </a:p>
+          <a:p>
+            <a:pPr>
+              <a:spcAft>
+                <a:spcPts val="800"/>
+              </a:spcAft>
+              <a:defRPr sz="1600">
+                <a:solidFill>
+                  <a:srgbClr val="282828"/>
+                </a:solidFill>
+              </a:defRPr>
+            </a:pPr>
+            <a:r>
+              <a:t>• Velocidad del viento</a:t>
+            </a:r>
+          </a:p>
+          <a:p>
+            <a:pPr>
+              <a:spcAft>
+                <a:spcPts val="800"/>
+              </a:spcAft>
+              <a:defRPr sz="1600">
+                <a:solidFill>
+                  <a:srgbClr val="282828"/>
+                </a:solidFill>
+              </a:defRPr>
+            </a:pPr>
+            <a:r>
+              <a:t>• Dirección del viento</a:t>
+            </a:r>
+          </a:p>
+          <a:p>
+            <a:pPr>
+              <a:spcAft>
+                <a:spcPts val="800"/>
+              </a:spcAft>
+              <a:defRPr sz="1600">
+                <a:solidFill>
+                  <a:srgbClr val="282828"/>
+                </a:solidFill>
+              </a:defRPr>
+            </a:pPr>
+            <a:r>
+              <a:t>• Precipitación acumulada</a:t>
+            </a:r>
+          </a:p>
+          <a:p>
+            <a:pPr>
+              <a:spcAft>
+                <a:spcPts val="800"/>
+              </a:spcAft>
+              <a:defRPr sz="1600">
+                <a:solidFill>
+                  <a:srgbClr val="282828"/>
+                </a:solidFill>
+              </a:defRPr>
+            </a:pPr>
+            <a:r>
+              <a:t>• Tasa de precipitación</a:t>
+            </a:r>
+          </a:p>
+        </p:txBody>
+      </p:sp>
+      <p:sp>
+        <p:nvSpPr>
+          <p:cNvPr id="5" name="TextBox 4"/>
+          <p:cNvSpPr txBox="1"/>
+          <p:nvPr/>
+        </p:nvSpPr>
+        <p:spPr>
+          <a:xfrm>
+            <a:off x="4572000" y="1371600"/>
+            <a:ext cx="4114800" cy="5029200"/>
+          </a:xfrm>
+          <a:prstGeom prst="rect">
+            <a:avLst/>
+          </a:prstGeom>
+          <a:noFill/>
+        </p:spPr>
+        <p:txBody>
+          <a:bodyPr wrap="square">
+            <a:spAutoFit/>
+          </a:bodyPr>
+          <a:lstStyle/>
+          <a:p/>
+          <a:p>
+            <a:pPr>
+              <a:spcAft>
+                <a:spcPts val="800"/>
+              </a:spcAft>
+              <a:defRPr sz="1600">
+                <a:solidFill>
+                  <a:srgbClr val="282828"/>
+                </a:solidFill>
+              </a:defRPr>
+            </a:pPr>
+            <a:r>
+              <a:t>• Punto de rocío</a:t>
+            </a:r>
+          </a:p>
+          <a:p>
+            <a:pPr>
+              <a:spcAft>
+                <a:spcPts val="800"/>
+              </a:spcAft>
+              <a:defRPr sz="1600">
+                <a:solidFill>
+                  <a:srgbClr val="282828"/>
+                </a:solidFill>
+              </a:defRPr>
+            </a:pPr>
+            <a:r>
+              <a:t>• Índice de calor</a:t>
+            </a:r>
+          </a:p>
+          <a:p>
+            <a:pPr>
+              <a:spcAft>
+                <a:spcPts val="800"/>
+              </a:spcAft>
+              <a:defRPr sz="1600">
+                <a:solidFill>
+                  <a:srgbClr val="282828"/>
+                </a:solidFill>
+              </a:defRPr>
+            </a:pPr>
+            <a:r>
+              <a:t>• Sensación térmica</a:t>
+            </a:r>
+          </a:p>
+          <a:p>
+            <a:pPr>
+              <a:spcAft>
+                <a:spcPts val="800"/>
+              </a:spcAft>
+              <a:defRPr sz="1600">
+                <a:solidFill>
+                  <a:srgbClr val="282828"/>
+                </a:solidFill>
+              </a:defRPr>
+            </a:pPr>
+            <a:r>
+              <a:t>• Radiación solar</a:t>
+            </a:r>
+          </a:p>
+          <a:p>
+            <a:pPr>
+              <a:spcAft>
+                <a:spcPts val="800"/>
+              </a:spcAft>
+              <a:defRPr sz="1600">
+                <a:solidFill>
+                  <a:srgbClr val="282828"/>
+                </a:solidFill>
+              </a:defRPr>
+            </a:pPr>
+            <a:r>
+              <a:t>• Índice UV</a:t>
+            </a:r>
+          </a:p>
+          <a:p>
+            <a:pPr>
+              <a:spcAft>
+                <a:spcPts val="800"/>
+              </a:spcAft>
+              <a:defRPr sz="1600">
+                <a:solidFill>
+                  <a:srgbClr val="282828"/>
+                </a:solidFill>
+              </a:defRPr>
+            </a:pPr>
+            <a:r>
+              <a:t>• Evapotranspiración</a:t>
+            </a:r>
+          </a:p>
+          <a:p>
+            <a:pPr>
+              <a:spcAft>
+                <a:spcPts val="800"/>
+              </a:spcAft>
+              <a:defRPr sz="1600">
+                <a:solidFill>
+                  <a:srgbClr val="282828"/>
+                </a:solidFill>
+              </a:defRPr>
+            </a:pPr>
+            <a:r>
+              <a:t>• Cobertura nubosa</a:t>
             </a:r>
           </a:p>
         </p:txBody>
@@ -5783,7 +6131,7 @@
               </a:defRPr>
             </a:pPr>
             <a:r>
-              <a:t>Control de Calidad de Datos</a:t>
+              <a:t>Arquitectura Modular del Sistema</a:t>
             </a:r>
           </a:p>
         </p:txBody>
@@ -5808,20 +6156,20 @@
               <a:spcAft>
                 <a:spcPts val="1000"/>
               </a:spcAft>
-              <a:defRPr sz="2000" b="1">
+              <a:defRPr sz="2200" b="1">
                 <a:solidFill>
                   <a:srgbClr val="0099CC"/>
                 </a:solidFill>
               </a:defRPr>
             </a:pPr>
             <a:r>
-              <a:t>Sistema de Quality Flags (según COI/UNESCO):</a:t>
+              <a:t>Componentes Principales:</a:t>
             </a:r>
           </a:p>
           <a:p>
             <a:pPr lvl="1">
               <a:spcAft>
-                <a:spcPts val="800"/>
+                <a:spcPts val="1000"/>
               </a:spcAft>
               <a:defRPr sz="1800">
                 <a:solidFill>
@@ -5830,13 +6178,13 @@
               </a:defRPr>
             </a:pPr>
             <a:r>
-              <a:t>Flag 1: Dato verificado como bueno</a:t>
+              <a:t>Contenedores Docker: Arquitectura modular y portable</a:t>
             </a:r>
           </a:p>
           <a:p>
             <a:pPr lvl="1">
               <a:spcAft>
-                <a:spcPts val="800"/>
+                <a:spcPts val="1000"/>
               </a:spcAft>
               <a:defRPr sz="1800">
                 <a:solidFill>
@@ -5845,13 +6193,13 @@
               </a:defRPr>
             </a:pPr>
             <a:r>
-              <a:t>Flag 2: Dato probablemente bueno</a:t>
+              <a:t>Tareas asíncronas con Celery: Procesamiento distribuido</a:t>
             </a:r>
           </a:p>
           <a:p>
             <a:pPr lvl="1">
               <a:spcAft>
-                <a:spcPts val="800"/>
+                <a:spcPts val="1000"/>
               </a:spcAft>
               <a:defRPr sz="1800">
                 <a:solidFill>
@@ -5860,13 +6208,13 @@
               </a:defRPr>
             </a:pPr>
             <a:r>
-              <a:t>Flag 3: Dato sospechoso (requiere revisión)</a:t>
+              <a:t>PostgreSQL: Base de datos con esquema orientado a metadatos</a:t>
             </a:r>
           </a:p>
           <a:p>
             <a:pPr lvl="1">
               <a:spcAft>
-                <a:spcPts val="800"/>
+                <a:spcPts val="1000"/>
               </a:spcAft>
               <a:defRPr sz="1800">
                 <a:solidFill>
@@ -5875,83 +6223,43 @@
               </a:defRPr>
             </a:pPr>
             <a:r>
-              <a:t>Flag 4: Dato erróneo (descartado)</a:t>
+              <a:t>Control de calidad según normativa COI</a:t>
+            </a:r>
+          </a:p>
+          <a:p>
+            <a:pPr lvl="1">
+              <a:spcAft>
+                <a:spcPts val="1000"/>
+              </a:spcAft>
+              <a:defRPr sz="1800">
+                <a:solidFill>
+                  <a:srgbClr val="282828"/>
+                </a:solidFill>
+              </a:defRPr>
+            </a:pPr>
+            <a:r>
+              <a:t>Frontend web: Dashboard de control y visualización</a:t>
             </a:r>
           </a:p>
           <a:p>
             <a:br/>
             <a:pPr>
-              <a:spcAft>
-                <a:spcPts val="1000"/>
-              </a:spcAft>
-              <a:defRPr sz="2000" b="1">
+              <a:defRPr sz="1600">
                 <a:solidFill>
                   <a:srgbClr val="0099CC"/>
                 </a:solidFill>
               </a:defRPr>
             </a:pPr>
             <a:r>
-              <a:t>Niveles de Procesamiento:</a:t>
-            </a:r>
-          </a:p>
-          <a:p>
-            <a:pPr lvl="1">
-              <a:defRPr sz="1800">
-                <a:solidFill>
-                  <a:srgbClr val="282828"/>
-                </a:solidFill>
-              </a:defRPr>
-            </a:pPr>
-            <a:r>
-              <a:t>Raw (crudo)</a:t>
-            </a:r>
-          </a:p>
-          <a:p>
-            <a:pPr lvl="1">
-              <a:defRPr sz="1800">
-                <a:solidFill>
-                  <a:srgbClr val="282828"/>
-                </a:solidFill>
-              </a:defRPr>
-            </a:pPr>
-            <a:r>
-              <a:t>QC-1 (control básico)</a:t>
-            </a:r>
-          </a:p>
-          <a:p>
-            <a:pPr lvl="1">
-              <a:defRPr sz="1800">
-                <a:solidFill>
-                  <a:srgbClr val="282828"/>
-                </a:solidFill>
-              </a:defRPr>
-            </a:pPr>
-            <a:r>
-              <a:t>QC-2 (control avanzado)</a:t>
-            </a:r>
-          </a:p>
-          <a:p>
-            <a:pPr lvl="1">
-              <a:defRPr sz="1800">
-                <a:solidFill>
-                  <a:srgbClr val="282828"/>
-                </a:solidFill>
-              </a:defRPr>
-            </a:pPr>
-            <a:r>
-              <a:t>Interpolated</a:t>
-            </a:r>
-          </a:p>
-          <a:p>
-            <a:pPr lvl="1">
-              <a:defRPr sz="1800">
-                <a:solidFill>
-                  <a:srgbClr val="282828"/>
-                </a:solidFill>
-              </a:defRPr>
-            </a:pPr>
-            <a:r>
-              <a:t>Derived (calculado)</a:t>
+              <a:t>✓ Diseño abierto y replicable</a:t>
+            </a:r>
+            <a:br/>
+            <a:r>
+              <a:t>✓ Sistema operativo 24/7</a:t>
+            </a:r>
+            <a:br/>
+            <a:r>
+              <a:t>✓ Actualización automática programada</a:t>
             </a:r>
           </a:p>
         </p:txBody>

</xml_diff>